<commit_message>
thank you slide added
</commit_message>
<xml_diff>
--- a/GitHub.pptx
+++ b/GitHub.pptx
@@ -21,6 +21,8 @@
     <p:sldId id="288" r:id="rId16"/>
     <p:sldId id="289" r:id="rId17"/>
     <p:sldId id="283" r:id="rId18"/>
+    <p:sldId id="302" r:id="rId19"/>
+    <p:sldId id="304" r:id="rId20"/>
   </p:sldIdLst>
   <p:sldSz cx="12192000" cy="6858000"/>
   <p:notesSz cx="6858000" cy="9144000"/>
@@ -3150,7 +3152,7 @@
         <p:spPr>
           <a:xfrm>
             <a:off x="838200" y="1992630"/>
-            <a:ext cx="3439160" cy="4550410"/>
+            <a:ext cx="5195570" cy="4550410"/>
           </a:xfrm>
           <a:solidFill>
             <a:schemeClr val="bg2">
@@ -3186,7 +3188,7 @@
                   <a:schemeClr val="bg1"/>
                 </a:solidFill>
               </a:rPr>
-              <a:t>  </a:t>
+              <a:t>      </a:t>
             </a:r>
             <a:r>
               <a:rPr lang="en-IN" altLang="en-US" sz="3200">
@@ -3240,7 +3242,7 @@
                   <a:schemeClr val="bg1"/>
                 </a:solidFill>
               </a:rPr>
-              <a:t>   2.  </a:t>
+              <a:t>       2.  </a:t>
             </a:r>
             <a:r>
               <a:rPr lang="en-US" altLang="en-IN" sz="3200">
@@ -3270,7 +3272,7 @@
                   <a:schemeClr val="bg1"/>
                 </a:solidFill>
               </a:rPr>
-              <a:t>   3.  </a:t>
+              <a:t>      3.  </a:t>
             </a:r>
             <a:r>
               <a:rPr lang="en-US" altLang="en-IN" sz="3200">
@@ -3308,7 +3310,7 @@
                   <a:schemeClr val="bg1"/>
                 </a:solidFill>
               </a:rPr>
-              <a:t>   4.  </a:t>
+              <a:t>      4.  </a:t>
             </a:r>
             <a:r>
               <a:rPr lang="en-US" altLang="en-IN" sz="3200">
@@ -3480,8 +3482,8 @@
         </p:nvSpPr>
         <p:spPr>
           <a:xfrm>
-            <a:off x="4373880" y="1991995"/>
-            <a:ext cx="3366135" cy="4551680"/>
+            <a:off x="6172200" y="1992630"/>
+            <a:ext cx="5181600" cy="4551680"/>
           </a:xfrm>
           <a:prstGeom prst="rect">
             <a:avLst/>
@@ -3685,7 +3687,7 @@
                   <a:schemeClr val="bg1"/>
                 </a:solidFill>
               </a:rPr>
-              <a:t>   5. </a:t>
+              <a:t>        5. </a:t>
             </a:r>
             <a:r>
               <a:rPr lang="en-US" altLang="en-IN" sz="3200">
@@ -3715,7 +3717,7 @@
                   <a:schemeClr val="bg1"/>
                 </a:solidFill>
               </a:rPr>
-              <a:t>   6. </a:t>
+              <a:t>       6. </a:t>
             </a:r>
             <a:r>
               <a:rPr lang="en-US" altLang="en-IN" sz="3200">
@@ -3745,17 +3747,9 @@
                   <a:schemeClr val="bg1"/>
                 </a:solidFill>
               </a:rPr>
-              <a:t>   7. </a:t>
-            </a:r>
-            <a:r>
-              <a:rPr lang="en-US" altLang="en-IN" sz="3200">
-                <a:solidFill>
-                  <a:schemeClr val="bg1"/>
-                </a:solidFill>
-              </a:rPr>
-              <a:t>Revert</a:t>
-            </a:r>
-            <a:endParaRPr lang="en-US" altLang="en-IN" sz="3200">
+              <a:t>       7. Read me</a:t>
+            </a:r>
+            <a:endParaRPr lang="en-IN" altLang="en-US" sz="3200">
               <a:solidFill>
                 <a:schemeClr val="bg1"/>
               </a:solidFill>
@@ -3775,390 +3769,8 @@
                   <a:schemeClr val="bg1"/>
                 </a:solidFill>
               </a:rPr>
-              <a:t>   8.</a:t>
-            </a:r>
-            <a:r>
-              <a:rPr lang="en-US" altLang="en-IN" sz="3200">
-                <a:solidFill>
-                  <a:schemeClr val="bg1"/>
-                </a:solidFill>
-              </a:rPr>
-              <a:t> Fork</a:t>
-            </a:r>
-            <a:endParaRPr lang="en-US" altLang="en-IN" sz="3200">
-              <a:solidFill>
-                <a:schemeClr val="bg1"/>
-              </a:solidFill>
-            </a:endParaRPr>
-          </a:p>
-          <a:p>
-            <a:pPr marL="457200" indent="-457200" algn="l">
-              <a:lnSpc>
-                <a:spcPct val="150000"/>
-              </a:lnSpc>
-              <a:buFont typeface="Arial" panose="020B0604020202020204" pitchFamily="34" charset="0"/>
-              <a:buChar char="•"/>
-            </a:pPr>
-            <a:endParaRPr lang="en-US" altLang="en-IN" sz="2800" b="1">
-              <a:solidFill>
-                <a:schemeClr val="bg1"/>
-              </a:solidFill>
-            </a:endParaRPr>
-          </a:p>
-          <a:p>
-            <a:pPr marL="457200" indent="-457200" algn="l">
-              <a:lnSpc>
-                <a:spcPct val="150000"/>
-              </a:lnSpc>
-              <a:buFont typeface="Arial" panose="020B0604020202020204" pitchFamily="34" charset="0"/>
-              <a:buChar char="•"/>
-            </a:pPr>
-            <a:endParaRPr lang="en-US" altLang="en-IN" sz="2800" b="1">
-              <a:solidFill>
-                <a:schemeClr val="bg1"/>
-              </a:solidFill>
-            </a:endParaRPr>
-          </a:p>
-          <a:p>
-            <a:pPr marL="457200" indent="-457200" algn="l">
-              <a:lnSpc>
-                <a:spcPct val="150000"/>
-              </a:lnSpc>
-              <a:buFont typeface="Arial" panose="020B0604020202020204" pitchFamily="34" charset="0"/>
-              <a:buChar char="•"/>
-            </a:pPr>
-            <a:endParaRPr lang="en-IN" altLang="en-US" sz="2800" b="1">
-              <a:solidFill>
-                <a:schemeClr val="bg1"/>
-              </a:solidFill>
-            </a:endParaRPr>
-          </a:p>
-          <a:p>
-            <a:pPr marL="342900" indent="-342900" algn="l">
-              <a:buFont typeface="Arial" panose="020B0604020202020204" pitchFamily="34" charset="0"/>
-              <a:buChar char="•"/>
-            </a:pPr>
-            <a:endParaRPr lang="en-IN" altLang="en-US" sz="2800" b="1">
-              <a:solidFill>
-                <a:schemeClr val="bg1"/>
-              </a:solidFill>
-            </a:endParaRPr>
-          </a:p>
-        </p:txBody>
-      </p:sp>
-      <p:sp>
-        <p:nvSpPr>
-          <p:cNvPr id="6" name="Content Placeholder 6"/>
-          <p:cNvSpPr>
-            <a:spLocks noGrp="1"/>
-          </p:cNvSpPr>
-          <p:nvPr/>
-        </p:nvSpPr>
-        <p:spPr>
-          <a:xfrm>
-            <a:off x="7924165" y="1992630"/>
-            <a:ext cx="3429635" cy="4549775"/>
-          </a:xfrm>
-          <a:prstGeom prst="rect">
-            <a:avLst/>
-          </a:prstGeom>
-          <a:solidFill>
-            <a:schemeClr val="bg2">
-              <a:lumMod val="25000"/>
-            </a:schemeClr>
-          </a:solidFill>
-        </p:spPr>
-        <p:txBody>
-          <a:bodyPr vert="horz" lIns="91440" tIns="45720" rIns="91440" bIns="45720" rtlCol="0">
-            <a:normAutofit/>
-          </a:bodyPr>
-          <a:lstStyle>
-            <a:lvl1pPr marL="228600" indent="-228600" algn="l" defTabSz="914400" rtl="0" eaLnBrk="1" latinLnBrk="0" hangingPunct="1">
-              <a:lnSpc>
-                <a:spcPct val="90000"/>
-              </a:lnSpc>
-              <a:spcBef>
-                <a:spcPts val="1000"/>
-              </a:spcBef>
-              <a:buFont typeface="Arial" panose="020B0604020202020204" pitchFamily="34" charset="0"/>
-              <a:buChar char="•"/>
-              <a:defRPr sz="2800" kern="1200">
-                <a:solidFill>
-                  <a:schemeClr val="tx1"/>
-                </a:solidFill>
-                <a:latin typeface="+mn-lt"/>
-                <a:ea typeface="+mn-ea"/>
-                <a:cs typeface="+mn-cs"/>
-              </a:defRPr>
-            </a:lvl1pPr>
-            <a:lvl2pPr marL="685800" indent="-228600" algn="l" defTabSz="914400" rtl="0" eaLnBrk="1" latinLnBrk="0" hangingPunct="1">
-              <a:lnSpc>
-                <a:spcPct val="90000"/>
-              </a:lnSpc>
-              <a:spcBef>
-                <a:spcPts val="500"/>
-              </a:spcBef>
-              <a:buFont typeface="Arial" panose="020B0604020202020204" pitchFamily="34" charset="0"/>
-              <a:buChar char="•"/>
-              <a:defRPr sz="2400" kern="1200">
-                <a:solidFill>
-                  <a:schemeClr val="tx1"/>
-                </a:solidFill>
-                <a:latin typeface="+mn-lt"/>
-                <a:ea typeface="+mn-ea"/>
-                <a:cs typeface="+mn-cs"/>
-              </a:defRPr>
-            </a:lvl2pPr>
-            <a:lvl3pPr marL="1143000" indent="-228600" algn="l" defTabSz="914400" rtl="0" eaLnBrk="1" latinLnBrk="0" hangingPunct="1">
-              <a:lnSpc>
-                <a:spcPct val="90000"/>
-              </a:lnSpc>
-              <a:spcBef>
-                <a:spcPts val="500"/>
-              </a:spcBef>
-              <a:buFont typeface="Arial" panose="020B0604020202020204" pitchFamily="34" charset="0"/>
-              <a:buChar char="•"/>
-              <a:defRPr sz="2000" kern="1200">
-                <a:solidFill>
-                  <a:schemeClr val="tx1"/>
-                </a:solidFill>
-                <a:latin typeface="+mn-lt"/>
-                <a:ea typeface="+mn-ea"/>
-                <a:cs typeface="+mn-cs"/>
-              </a:defRPr>
-            </a:lvl3pPr>
-            <a:lvl4pPr marL="1600200" indent="-228600" algn="l" defTabSz="914400" rtl="0" eaLnBrk="1" latinLnBrk="0" hangingPunct="1">
-              <a:lnSpc>
-                <a:spcPct val="90000"/>
-              </a:lnSpc>
-              <a:spcBef>
-                <a:spcPts val="500"/>
-              </a:spcBef>
-              <a:buFont typeface="Arial" panose="020B0604020202020204" pitchFamily="34" charset="0"/>
-              <a:buChar char="•"/>
-              <a:defRPr sz="1800" kern="1200">
-                <a:solidFill>
-                  <a:schemeClr val="tx1"/>
-                </a:solidFill>
-                <a:latin typeface="+mn-lt"/>
-                <a:ea typeface="+mn-ea"/>
-                <a:cs typeface="+mn-cs"/>
-              </a:defRPr>
-            </a:lvl4pPr>
-            <a:lvl5pPr marL="2057400" indent="-228600" algn="l" defTabSz="914400" rtl="0" eaLnBrk="1" latinLnBrk="0" hangingPunct="1">
-              <a:lnSpc>
-                <a:spcPct val="90000"/>
-              </a:lnSpc>
-              <a:spcBef>
-                <a:spcPts val="500"/>
-              </a:spcBef>
-              <a:buFont typeface="Arial" panose="020B0604020202020204" pitchFamily="34" charset="0"/>
-              <a:buChar char="•"/>
-              <a:defRPr sz="1800" kern="1200">
-                <a:solidFill>
-                  <a:schemeClr val="tx1"/>
-                </a:solidFill>
-                <a:latin typeface="+mn-lt"/>
-                <a:ea typeface="+mn-ea"/>
-                <a:cs typeface="+mn-cs"/>
-              </a:defRPr>
-            </a:lvl5pPr>
-            <a:lvl6pPr marL="2514600" indent="-228600" algn="l" defTabSz="914400" rtl="0" eaLnBrk="1" latinLnBrk="0" hangingPunct="1">
-              <a:lnSpc>
-                <a:spcPct val="90000"/>
-              </a:lnSpc>
-              <a:spcBef>
-                <a:spcPts val="500"/>
-              </a:spcBef>
-              <a:buFont typeface="Arial" panose="020B0604020202020204" pitchFamily="34" charset="0"/>
-              <a:buChar char="•"/>
-              <a:defRPr sz="1800" kern="1200">
-                <a:solidFill>
-                  <a:schemeClr val="tx1"/>
-                </a:solidFill>
-                <a:latin typeface="+mn-lt"/>
-                <a:ea typeface="+mn-ea"/>
-                <a:cs typeface="+mn-cs"/>
-              </a:defRPr>
-            </a:lvl6pPr>
-            <a:lvl7pPr marL="2971800" indent="-228600" algn="l" defTabSz="914400" rtl="0" eaLnBrk="1" latinLnBrk="0" hangingPunct="1">
-              <a:lnSpc>
-                <a:spcPct val="90000"/>
-              </a:lnSpc>
-              <a:spcBef>
-                <a:spcPts val="500"/>
-              </a:spcBef>
-              <a:buFont typeface="Arial" panose="020B0604020202020204" pitchFamily="34" charset="0"/>
-              <a:buChar char="•"/>
-              <a:defRPr sz="1800" kern="1200">
-                <a:solidFill>
-                  <a:schemeClr val="tx1"/>
-                </a:solidFill>
-                <a:latin typeface="+mn-lt"/>
-                <a:ea typeface="+mn-ea"/>
-                <a:cs typeface="+mn-cs"/>
-              </a:defRPr>
-            </a:lvl7pPr>
-            <a:lvl8pPr marL="3429000" indent="-228600" algn="l" defTabSz="914400" rtl="0" eaLnBrk="1" latinLnBrk="0" hangingPunct="1">
-              <a:lnSpc>
-                <a:spcPct val="90000"/>
-              </a:lnSpc>
-              <a:spcBef>
-                <a:spcPts val="500"/>
-              </a:spcBef>
-              <a:buFont typeface="Arial" panose="020B0604020202020204" pitchFamily="34" charset="0"/>
-              <a:buChar char="•"/>
-              <a:defRPr sz="1800" kern="1200">
-                <a:solidFill>
-                  <a:schemeClr val="tx1"/>
-                </a:solidFill>
-                <a:latin typeface="+mn-lt"/>
-                <a:ea typeface="+mn-ea"/>
-                <a:cs typeface="+mn-cs"/>
-              </a:defRPr>
-            </a:lvl8pPr>
-            <a:lvl9pPr marL="3886200" indent="-228600" algn="l" defTabSz="914400" rtl="0" eaLnBrk="1" latinLnBrk="0" hangingPunct="1">
-              <a:lnSpc>
-                <a:spcPct val="90000"/>
-              </a:lnSpc>
-              <a:spcBef>
-                <a:spcPts val="500"/>
-              </a:spcBef>
-              <a:buFont typeface="Arial" panose="020B0604020202020204" pitchFamily="34" charset="0"/>
-              <a:buChar char="•"/>
-              <a:defRPr sz="1800" kern="1200">
-                <a:solidFill>
-                  <a:schemeClr val="tx1"/>
-                </a:solidFill>
-                <a:latin typeface="+mn-lt"/>
-                <a:ea typeface="+mn-ea"/>
-                <a:cs typeface="+mn-cs"/>
-              </a:defRPr>
-            </a:lvl9pPr>
-          </a:lstStyle>
-          <a:p>
-            <a:pPr marL="0" indent="0" algn="l">
-              <a:buFont typeface="Arial" panose="020B0604020202020204" pitchFamily="34" charset="0"/>
-              <a:buNone/>
-            </a:pPr>
-            <a:endParaRPr lang="en-US" altLang="en-IN" sz="2800" b="1">
-              <a:solidFill>
-                <a:schemeClr val="bg1"/>
-              </a:solidFill>
-            </a:endParaRPr>
-          </a:p>
-          <a:p>
-            <a:pPr marL="0" indent="0" algn="l">
-              <a:lnSpc>
-                <a:spcPct val="150000"/>
-              </a:lnSpc>
-              <a:buFont typeface="Arial" panose="020B0604020202020204" pitchFamily="34" charset="0"/>
-              <a:buNone/>
-            </a:pPr>
-            <a:r>
-              <a:rPr lang="en-IN" altLang="en-US" sz="3200">
-                <a:solidFill>
-                  <a:schemeClr val="bg1"/>
-                </a:solidFill>
-              </a:rPr>
-              <a:t>   9. Release</a:t>
-            </a:r>
-            <a:endParaRPr lang="en-IN" altLang="en-US" sz="3200">
-              <a:solidFill>
-                <a:schemeClr val="bg1"/>
-              </a:solidFill>
-            </a:endParaRPr>
-          </a:p>
-          <a:p>
-            <a:pPr marL="0" indent="0" algn="l">
-              <a:lnSpc>
-                <a:spcPct val="150000"/>
-              </a:lnSpc>
-              <a:buFont typeface="Arial" panose="020B0604020202020204" pitchFamily="34" charset="0"/>
-              <a:buNone/>
-            </a:pPr>
-            <a:r>
-              <a:rPr lang="en-IN" altLang="en-US" sz="3200">
-                <a:solidFill>
-                  <a:schemeClr val="bg1"/>
-                </a:solidFill>
-              </a:rPr>
-              <a:t>   10. Read me</a:t>
-            </a:r>
-            <a:endParaRPr lang="en-IN" altLang="en-US" sz="3200">
-              <a:solidFill>
-                <a:schemeClr val="bg1"/>
-              </a:solidFill>
-            </a:endParaRPr>
-          </a:p>
-          <a:p>
-            <a:pPr marL="0" indent="0" algn="l">
-              <a:lnSpc>
-                <a:spcPct val="150000"/>
-              </a:lnSpc>
-              <a:buFont typeface="Arial" panose="020B0604020202020204" pitchFamily="34" charset="0"/>
-              <a:buNone/>
-            </a:pPr>
-            <a:r>
-              <a:rPr lang="en-IN" altLang="en-US" sz="3200">
-                <a:solidFill>
-                  <a:schemeClr val="bg1"/>
-                </a:solidFill>
-              </a:rPr>
-              <a:t>   11. </a:t>
-            </a:r>
-            <a:r>
-              <a:rPr lang="en-US" altLang="en-IN" sz="3200">
-                <a:solidFill>
-                  <a:schemeClr val="bg1"/>
-                </a:solidFill>
-              </a:rPr>
-              <a:t>Revert</a:t>
-            </a:r>
-            <a:endParaRPr lang="en-US" altLang="en-IN" sz="3200">
-              <a:solidFill>
-                <a:schemeClr val="bg1"/>
-              </a:solidFill>
-            </a:endParaRPr>
-          </a:p>
-          <a:p>
-            <a:pPr marL="0" indent="0" algn="l">
-              <a:lnSpc>
-                <a:spcPct val="150000"/>
-              </a:lnSpc>
-              <a:buFont typeface="Arial" panose="020B0604020202020204" pitchFamily="34" charset="0"/>
-              <a:buNone/>
-            </a:pPr>
-            <a:r>
-              <a:rPr lang="en-IN" altLang="en-US" sz="3200">
-                <a:solidFill>
-                  <a:schemeClr val="bg1"/>
-                </a:solidFill>
-              </a:rPr>
-              <a:t>   12.</a:t>
-            </a:r>
-            <a:r>
-              <a:rPr lang="en-US" altLang="en-IN" sz="3200">
-                <a:solidFill>
-                  <a:schemeClr val="bg1"/>
-                </a:solidFill>
-              </a:rPr>
-              <a:t> Fork</a:t>
-            </a:r>
-            <a:endParaRPr lang="en-US" altLang="en-IN" sz="3200">
-              <a:solidFill>
-                <a:schemeClr val="bg1"/>
-              </a:solidFill>
-            </a:endParaRPr>
-          </a:p>
-          <a:p>
-            <a:pPr marL="457200" indent="-457200" algn="l">
-              <a:lnSpc>
-                <a:spcPct val="150000"/>
-              </a:lnSpc>
-              <a:buFont typeface="Arial" panose="020B0604020202020204" pitchFamily="34" charset="0"/>
-              <a:buChar char="•"/>
-            </a:pPr>
+              <a:t>       8. Release</a:t>
+            </a:r>
             <a:endParaRPr lang="en-US" altLang="en-IN" sz="2800" b="1">
               <a:solidFill>
                 <a:schemeClr val="bg1"/>
@@ -7616,7 +7228,7 @@
         <p:spPr>
           <a:xfrm>
             <a:off x="904240" y="2025650"/>
-            <a:ext cx="6751955" cy="4487545"/>
+            <a:ext cx="10544810" cy="4487545"/>
           </a:xfrm>
           <a:solidFill>
             <a:schemeClr val="bg2">
@@ -7626,7 +7238,7 @@
         </p:spPr>
         <p:txBody>
           <a:bodyPr>
-            <a:normAutofit fontScale="90000"/>
+            <a:normAutofit/>
           </a:bodyPr>
           <a:p>
             <a:pPr algn="l">
@@ -7655,16 +7267,16 @@
               <a:buChar char="•"/>
             </a:pPr>
             <a:r>
-              <a:rPr lang="en-US" altLang="en-IN" sz="2095">
+              <a:rPr lang="en-IN" altLang="en-US" sz="2095">
                 <a:solidFill>
                   <a:schemeClr val="bg1"/>
                 </a:solidFill>
                 <a:latin typeface="Calibri" panose="020F0502020204030204" charset="0"/>
                 <a:cs typeface="Calibri" panose="020F0502020204030204" charset="0"/>
               </a:rPr>
-              <a:t>A Branch is a isolate development work without affecting other branches in the repository</a:t>
-            </a:r>
-            <a:endParaRPr lang="en-US" altLang="en-IN" sz="2095">
+              <a:t>Merge is nothing but merge the created branch into master branch</a:t>
+            </a:r>
+            <a:endParaRPr lang="en-IN" altLang="en-US" sz="2095">
               <a:solidFill>
                 <a:schemeClr val="bg1"/>
               </a:solidFill>
@@ -7680,18 +7292,7 @@
               <a:buFont typeface="Arial" panose="020B0604020202020204" pitchFamily="34" charset="0"/>
               <a:buChar char="•"/>
             </a:pPr>
-            <a:r>
-              <a:rPr lang="en-US" altLang="en-IN">
-                <a:solidFill>
-                  <a:schemeClr val="bg1"/>
-                </a:solidFill>
-                <a:latin typeface="Calibri" panose="020F0502020204030204" charset="0"/>
-                <a:cs typeface="Calibri" panose="020F0502020204030204" charset="0"/>
-                <a:sym typeface="+mn-ea"/>
-              </a:rPr>
-              <a:t>We can add multiple branches to the repository</a:t>
-            </a:r>
-            <a:endParaRPr lang="en-US">
+            <a:endParaRPr lang="en-IN" altLang="en-US" sz="2095">
               <a:solidFill>
                 <a:schemeClr val="bg1"/>
               </a:solidFill>
@@ -7700,31 +7301,18 @@
             </a:endParaRPr>
           </a:p>
           <a:p>
-            <a:pPr marL="914400" lvl="1" indent="-457200" algn="l">
+            <a:pPr lvl="1" algn="l">
               <a:lnSpc>
                 <a:spcPct val="150000"/>
               </a:lnSpc>
               <a:buFont typeface="Arial" panose="020B0604020202020204" pitchFamily="34" charset="0"/>
-              <a:buChar char="•"/>
-            </a:pPr>
-            <a:r>
-              <a:rPr lang="en-US" altLang="en-IN" sz="2095">
-                <a:solidFill>
-                  <a:schemeClr val="bg1"/>
-                </a:solidFill>
-                <a:latin typeface="Calibri" panose="020F0502020204030204" charset="0"/>
-                <a:cs typeface="Calibri" panose="020F0502020204030204" charset="0"/>
-                <a:sym typeface="+mn-ea"/>
-              </a:rPr>
-              <a:t>Each repository has one default branch named Master-Main.</a:t>
-            </a:r>
-            <a:endParaRPr lang="en-US" altLang="en-IN" sz="2095">
+            </a:pPr>
+            <a:endParaRPr lang="en-IN" altLang="en-US" sz="2095">
               <a:solidFill>
                 <a:schemeClr val="bg1"/>
               </a:solidFill>
               <a:latin typeface="Calibri" panose="020F0502020204030204" charset="0"/>
               <a:cs typeface="Calibri" panose="020F0502020204030204" charset="0"/>
-              <a:sym typeface="+mn-ea"/>
             </a:endParaRPr>
           </a:p>
           <a:p>
@@ -7735,7 +7323,7 @@
               <a:buFont typeface="Arial" panose="020B0604020202020204" pitchFamily="34" charset="0"/>
             </a:pPr>
             <a:r>
-              <a:rPr lang="en-US" altLang="en-IN" sz="2800" b="1">
+              <a:rPr lang="en-IN" altLang="en-US" sz="2800" b="1">
                 <a:solidFill>
                   <a:schemeClr val="accent1"/>
                 </a:solidFill>
@@ -7750,7 +7338,25 @@
                 <a:cs typeface="Times New Roman" panose="02020603050405020304" charset="0"/>
                 <a:sym typeface="+mn-ea"/>
               </a:rPr>
-              <a:t>Example:</a:t>
+              <a:t>Pull Request</a:t>
+            </a:r>
+            <a:r>
+              <a:rPr lang="en-US" altLang="en-IN" sz="2800" b="1">
+                <a:solidFill>
+                  <a:schemeClr val="accent1"/>
+                </a:solidFill>
+                <a:effectLst>
+                  <a:outerShdw blurRad="38100" dist="25400" dir="5400000" algn="ctr" rotWithShape="0">
+                    <a:srgbClr val="6E747A">
+                      <a:alpha val="43000"/>
+                    </a:srgbClr>
+                  </a:outerShdw>
+                </a:effectLst>
+                <a:latin typeface="Times New Roman" panose="02020603050405020304" charset="0"/>
+                <a:cs typeface="Times New Roman" panose="02020603050405020304" charset="0"/>
+                <a:sym typeface="+mn-ea"/>
+              </a:rPr>
+              <a:t>:</a:t>
             </a:r>
             <a:endParaRPr lang="en-US" altLang="en-IN" sz="2800" b="1">
               <a:solidFill>
@@ -7769,7 +7375,7 @@
               <a:buFont typeface="Arial" panose="020B0604020202020204" pitchFamily="34" charset="0"/>
             </a:pPr>
             <a:r>
-              <a:rPr lang="en-US" altLang="en-IN" sz="2095">
+              <a:rPr lang="en-IN" altLang="en-US" sz="2400" b="1">
                 <a:solidFill>
                   <a:schemeClr val="bg1"/>
                 </a:solidFill>
@@ -7777,25 +7383,9 @@
                 <a:cs typeface="Calibri" panose="020F0502020204030204" charset="0"/>
                 <a:sym typeface="+mn-ea"/>
               </a:rPr>
-              <a:t>Adding new features without  affecting the production code.</a:t>
-            </a:r>
-            <a:endParaRPr lang="en-US" altLang="en-IN" sz="2095">
-              <a:solidFill>
-                <a:schemeClr val="bg1"/>
-              </a:solidFill>
-              <a:latin typeface="Calibri" panose="020F0502020204030204" charset="0"/>
-              <a:cs typeface="Calibri" panose="020F0502020204030204" charset="0"/>
-              <a:sym typeface="+mn-ea"/>
-            </a:endParaRPr>
-          </a:p>
-          <a:p>
-            <a:pPr lvl="1" algn="l">
-              <a:lnSpc>
-                <a:spcPct val="150000"/>
-              </a:lnSpc>
-              <a:buFont typeface="Arial" panose="020B0604020202020204" pitchFamily="34" charset="0"/>
-            </a:pPr>
-            <a:endParaRPr lang="en-US" altLang="en-IN" sz="2400" b="1">
+              <a:t>It is a request to merge the new branch to the master branch</a:t>
+            </a:r>
+            <a:endParaRPr lang="en-IN" altLang="en-US" sz="2400" b="1">
               <a:solidFill>
                 <a:schemeClr val="bg1"/>
               </a:solidFill>
@@ -8047,6 +7637,17 @@
               <a:t>    </a:t>
             </a:r>
             <a:r>
+              <a:rPr lang="en-IN" altLang="en-US" sz="2095">
+                <a:solidFill>
+                  <a:schemeClr val="bg1"/>
+                </a:solidFill>
+                <a:latin typeface="Times New Roman" panose="02020603050405020304" charset="0"/>
+                <a:cs typeface="Times New Roman" panose="02020603050405020304" charset="0"/>
+                <a:sym typeface="+mn-ea"/>
+              </a:rPr>
+              <a:t>		</a:t>
+            </a:r>
+            <a:r>
               <a:rPr lang="en-US" altLang="en-IN" sz="3600" b="1">
                 <a:solidFill>
                   <a:schemeClr val="accent1"/>
@@ -8062,7 +7663,7 @@
                 <a:cs typeface="Times New Roman" panose="02020603050405020304" charset="0"/>
                 <a:sym typeface="+mn-ea"/>
               </a:rPr>
-              <a:t>Merge - Pull Request - Conflict</a:t>
+              <a:t>Merge - Pull Request </a:t>
             </a:r>
             <a:endParaRPr lang="en-US" altLang="en-IN" sz="3600" b="1">
               <a:solidFill>
@@ -8077,364 +7678,6 @@
               </a:effectLst>
               <a:latin typeface="Times New Roman" panose="02020603050405020304" charset="0"/>
               <a:cs typeface="Times New Roman" panose="02020603050405020304" charset="0"/>
-              <a:sym typeface="+mn-ea"/>
-            </a:endParaRPr>
-          </a:p>
-        </p:txBody>
-      </p:sp>
-      <p:sp>
-        <p:nvSpPr>
-          <p:cNvPr id="2" name="Subtitle 6"/>
-          <p:cNvSpPr>
-            <a:spLocks noGrp="1"/>
-          </p:cNvSpPr>
-          <p:nvPr/>
-        </p:nvSpPr>
-        <p:spPr>
-          <a:xfrm>
-            <a:off x="7791450" y="2025650"/>
-            <a:ext cx="3658235" cy="4487545"/>
-          </a:xfrm>
-          <a:prstGeom prst="rect">
-            <a:avLst/>
-          </a:prstGeom>
-          <a:solidFill>
-            <a:schemeClr val="bg2">
-              <a:lumMod val="25000"/>
-            </a:schemeClr>
-          </a:solidFill>
-        </p:spPr>
-        <p:txBody>
-          <a:bodyPr vert="horz" lIns="91440" tIns="45720" rIns="91440" bIns="45720" rtlCol="0">
-            <a:normAutofit/>
-          </a:bodyPr>
-          <a:lstStyle>
-            <a:lvl1pPr marL="0" indent="0" algn="ctr" defTabSz="914400" rtl="0" eaLnBrk="1" latinLnBrk="0" hangingPunct="1">
-              <a:lnSpc>
-                <a:spcPct val="90000"/>
-              </a:lnSpc>
-              <a:spcBef>
-                <a:spcPts val="1000"/>
-              </a:spcBef>
-              <a:buFont typeface="Arial" panose="020B0604020202020204" pitchFamily="34" charset="0"/>
-              <a:buNone/>
-              <a:defRPr sz="2400" kern="1200">
-                <a:solidFill>
-                  <a:schemeClr val="tx1"/>
-                </a:solidFill>
-                <a:latin typeface="+mn-lt"/>
-                <a:ea typeface="+mn-ea"/>
-                <a:cs typeface="+mn-cs"/>
-              </a:defRPr>
-            </a:lvl1pPr>
-            <a:lvl2pPr marL="457200" indent="0" algn="ctr" defTabSz="914400" rtl="0" eaLnBrk="1" latinLnBrk="0" hangingPunct="1">
-              <a:lnSpc>
-                <a:spcPct val="90000"/>
-              </a:lnSpc>
-              <a:spcBef>
-                <a:spcPts val="500"/>
-              </a:spcBef>
-              <a:buFont typeface="Arial" panose="020B0604020202020204" pitchFamily="34" charset="0"/>
-              <a:buNone/>
-              <a:defRPr sz="2000" kern="1200">
-                <a:solidFill>
-                  <a:schemeClr val="tx1"/>
-                </a:solidFill>
-                <a:latin typeface="+mn-lt"/>
-                <a:ea typeface="+mn-ea"/>
-                <a:cs typeface="+mn-cs"/>
-              </a:defRPr>
-            </a:lvl2pPr>
-            <a:lvl3pPr marL="914400" indent="0" algn="ctr" defTabSz="914400" rtl="0" eaLnBrk="1" latinLnBrk="0" hangingPunct="1">
-              <a:lnSpc>
-                <a:spcPct val="90000"/>
-              </a:lnSpc>
-              <a:spcBef>
-                <a:spcPts val="500"/>
-              </a:spcBef>
-              <a:buFont typeface="Arial" panose="020B0604020202020204" pitchFamily="34" charset="0"/>
-              <a:buNone/>
-              <a:defRPr sz="1800" kern="1200">
-                <a:solidFill>
-                  <a:schemeClr val="tx1"/>
-                </a:solidFill>
-                <a:latin typeface="+mn-lt"/>
-                <a:ea typeface="+mn-ea"/>
-                <a:cs typeface="+mn-cs"/>
-              </a:defRPr>
-            </a:lvl3pPr>
-            <a:lvl4pPr marL="1371600" indent="0" algn="ctr" defTabSz="914400" rtl="0" eaLnBrk="1" latinLnBrk="0" hangingPunct="1">
-              <a:lnSpc>
-                <a:spcPct val="90000"/>
-              </a:lnSpc>
-              <a:spcBef>
-                <a:spcPts val="500"/>
-              </a:spcBef>
-              <a:buFont typeface="Arial" panose="020B0604020202020204" pitchFamily="34" charset="0"/>
-              <a:buNone/>
-              <a:defRPr sz="1600" kern="1200">
-                <a:solidFill>
-                  <a:schemeClr val="tx1"/>
-                </a:solidFill>
-                <a:latin typeface="+mn-lt"/>
-                <a:ea typeface="+mn-ea"/>
-                <a:cs typeface="+mn-cs"/>
-              </a:defRPr>
-            </a:lvl4pPr>
-            <a:lvl5pPr marL="1828800" indent="0" algn="ctr" defTabSz="914400" rtl="0" eaLnBrk="1" latinLnBrk="0" hangingPunct="1">
-              <a:lnSpc>
-                <a:spcPct val="90000"/>
-              </a:lnSpc>
-              <a:spcBef>
-                <a:spcPts val="500"/>
-              </a:spcBef>
-              <a:buFont typeface="Arial" panose="020B0604020202020204" pitchFamily="34" charset="0"/>
-              <a:buNone/>
-              <a:defRPr sz="1600" kern="1200">
-                <a:solidFill>
-                  <a:schemeClr val="tx1"/>
-                </a:solidFill>
-                <a:latin typeface="+mn-lt"/>
-                <a:ea typeface="+mn-ea"/>
-                <a:cs typeface="+mn-cs"/>
-              </a:defRPr>
-            </a:lvl5pPr>
-            <a:lvl6pPr marL="2286000" indent="0" algn="ctr" defTabSz="914400" rtl="0" eaLnBrk="1" latinLnBrk="0" hangingPunct="1">
-              <a:lnSpc>
-                <a:spcPct val="90000"/>
-              </a:lnSpc>
-              <a:spcBef>
-                <a:spcPts val="500"/>
-              </a:spcBef>
-              <a:buFont typeface="Arial" panose="020B0604020202020204" pitchFamily="34" charset="0"/>
-              <a:buNone/>
-              <a:defRPr sz="1600" kern="1200">
-                <a:solidFill>
-                  <a:schemeClr val="tx1"/>
-                </a:solidFill>
-                <a:latin typeface="+mn-lt"/>
-                <a:ea typeface="+mn-ea"/>
-                <a:cs typeface="+mn-cs"/>
-              </a:defRPr>
-            </a:lvl6pPr>
-            <a:lvl7pPr marL="2743200" indent="0" algn="ctr" defTabSz="914400" rtl="0" eaLnBrk="1" latinLnBrk="0" hangingPunct="1">
-              <a:lnSpc>
-                <a:spcPct val="90000"/>
-              </a:lnSpc>
-              <a:spcBef>
-                <a:spcPts val="500"/>
-              </a:spcBef>
-              <a:buFont typeface="Arial" panose="020B0604020202020204" pitchFamily="34" charset="0"/>
-              <a:buNone/>
-              <a:defRPr sz="1600" kern="1200">
-                <a:solidFill>
-                  <a:schemeClr val="tx1"/>
-                </a:solidFill>
-                <a:latin typeface="+mn-lt"/>
-                <a:ea typeface="+mn-ea"/>
-                <a:cs typeface="+mn-cs"/>
-              </a:defRPr>
-            </a:lvl7pPr>
-            <a:lvl8pPr marL="3200400" indent="0" algn="ctr" defTabSz="914400" rtl="0" eaLnBrk="1" latinLnBrk="0" hangingPunct="1">
-              <a:lnSpc>
-                <a:spcPct val="90000"/>
-              </a:lnSpc>
-              <a:spcBef>
-                <a:spcPts val="500"/>
-              </a:spcBef>
-              <a:buFont typeface="Arial" panose="020B0604020202020204" pitchFamily="34" charset="0"/>
-              <a:buNone/>
-              <a:defRPr sz="1600" kern="1200">
-                <a:solidFill>
-                  <a:schemeClr val="tx1"/>
-                </a:solidFill>
-                <a:latin typeface="+mn-lt"/>
-                <a:ea typeface="+mn-ea"/>
-                <a:cs typeface="+mn-cs"/>
-              </a:defRPr>
-            </a:lvl8pPr>
-            <a:lvl9pPr marL="3657600" indent="0" algn="ctr" defTabSz="914400" rtl="0" eaLnBrk="1" latinLnBrk="0" hangingPunct="1">
-              <a:lnSpc>
-                <a:spcPct val="90000"/>
-              </a:lnSpc>
-              <a:spcBef>
-                <a:spcPts val="500"/>
-              </a:spcBef>
-              <a:buFont typeface="Arial" panose="020B0604020202020204" pitchFamily="34" charset="0"/>
-              <a:buNone/>
-              <a:defRPr sz="1600" kern="1200">
-                <a:solidFill>
-                  <a:schemeClr val="tx1"/>
-                </a:solidFill>
-                <a:latin typeface="+mn-lt"/>
-                <a:ea typeface="+mn-ea"/>
-                <a:cs typeface="+mn-cs"/>
-              </a:defRPr>
-            </a:lvl9pPr>
-          </a:lstStyle>
-          <a:p>
-            <a:pPr algn="l">
-              <a:buFont typeface="Arial" panose="020B0604020202020204" pitchFamily="34" charset="0"/>
-            </a:pPr>
-            <a:r>
-              <a:rPr lang="en-IN" altLang="en-US" b="1">
-                <a:solidFill>
-                  <a:schemeClr val="bg1"/>
-                </a:solidFill>
-              </a:rPr>
-              <a:t>		</a:t>
-            </a:r>
-            <a:endParaRPr lang="en-IN" altLang="en-US" sz="2800" b="1">
-              <a:solidFill>
-                <a:schemeClr val="bg1"/>
-              </a:solidFill>
-            </a:endParaRPr>
-          </a:p>
-          <a:p>
-            <a:pPr marL="0" lvl="1" algn="l">
-              <a:lnSpc>
-                <a:spcPct val="150000"/>
-              </a:lnSpc>
-              <a:buFont typeface="Arial" panose="020B0604020202020204" pitchFamily="34" charset="0"/>
-            </a:pPr>
-            <a:r>
-              <a:rPr lang="en-US" altLang="en-IN" sz="2095" b="1">
-                <a:solidFill>
-                  <a:schemeClr val="accent1"/>
-                </a:solidFill>
-                <a:effectLst>
-                  <a:outerShdw blurRad="38100" dist="25400" dir="5400000" algn="ctr" rotWithShape="0">
-                    <a:srgbClr val="6E747A">
-                      <a:alpha val="43000"/>
-                    </a:srgbClr>
-                  </a:outerShdw>
-                </a:effectLst>
-                <a:latin typeface="Times New Roman" panose="02020603050405020304" charset="0"/>
-                <a:cs typeface="Times New Roman" panose="02020603050405020304" charset="0"/>
-                <a:sym typeface="+mn-ea"/>
-              </a:rPr>
-              <a:t>Uses:</a:t>
-            </a:r>
-            <a:endParaRPr lang="en-US" altLang="en-IN" sz="2095" b="1">
-              <a:solidFill>
-                <a:schemeClr val="accent1"/>
-              </a:solidFill>
-              <a:effectLst>
-                <a:outerShdw blurRad="38100" dist="25400" dir="5400000" algn="ctr" rotWithShape="0">
-                  <a:srgbClr val="6E747A">
-                    <a:alpha val="43000"/>
-                  </a:srgbClr>
-                </a:outerShdw>
-              </a:effectLst>
-              <a:latin typeface="Times New Roman" panose="02020603050405020304" charset="0"/>
-              <a:cs typeface="Times New Roman" panose="02020603050405020304" charset="0"/>
-              <a:sym typeface="+mn-ea"/>
-            </a:endParaRPr>
-          </a:p>
-          <a:p>
-            <a:pPr marL="914400" lvl="4" indent="-342900" algn="l">
-              <a:lnSpc>
-                <a:spcPct val="150000"/>
-              </a:lnSpc>
-              <a:buFont typeface="Arial" panose="020B0604020202020204" pitchFamily="34" charset="0"/>
-              <a:buChar char="•"/>
-            </a:pPr>
-            <a:r>
-              <a:rPr lang="en-US" altLang="en-IN" sz="2000">
-                <a:solidFill>
-                  <a:schemeClr val="bg1"/>
-                </a:solidFill>
-                <a:latin typeface="Calibri" panose="020F0502020204030204" charset="0"/>
-                <a:cs typeface="Calibri" panose="020F0502020204030204" charset="0"/>
-                <a:sym typeface="+mn-ea"/>
-              </a:rPr>
-              <a:t>New Features</a:t>
-            </a:r>
-            <a:endParaRPr lang="en-US" altLang="en-IN" sz="2000">
-              <a:solidFill>
-                <a:schemeClr val="bg1"/>
-              </a:solidFill>
-              <a:latin typeface="Calibri" panose="020F0502020204030204" charset="0"/>
-              <a:cs typeface="Calibri" panose="020F0502020204030204" charset="0"/>
-              <a:sym typeface="+mn-ea"/>
-            </a:endParaRPr>
-          </a:p>
-          <a:p>
-            <a:pPr marL="914400" lvl="4" indent="-342900" algn="l">
-              <a:lnSpc>
-                <a:spcPct val="150000"/>
-              </a:lnSpc>
-              <a:buFont typeface="Arial" panose="020B0604020202020204" pitchFamily="34" charset="0"/>
-              <a:buChar char="•"/>
-            </a:pPr>
-            <a:r>
-              <a:rPr lang="en-US" altLang="en-IN" sz="2000">
-                <a:solidFill>
-                  <a:schemeClr val="bg1"/>
-                </a:solidFill>
-                <a:latin typeface="Calibri" panose="020F0502020204030204" charset="0"/>
-                <a:cs typeface="Calibri" panose="020F0502020204030204" charset="0"/>
-                <a:sym typeface="+mn-ea"/>
-              </a:rPr>
-              <a:t>Bug fixes</a:t>
-            </a:r>
-            <a:endParaRPr lang="en-US" altLang="en-IN" sz="2000">
-              <a:solidFill>
-                <a:schemeClr val="bg1"/>
-              </a:solidFill>
-              <a:latin typeface="Calibri" panose="020F0502020204030204" charset="0"/>
-              <a:cs typeface="Calibri" panose="020F0502020204030204" charset="0"/>
-              <a:sym typeface="+mn-ea"/>
-            </a:endParaRPr>
-          </a:p>
-          <a:p>
-            <a:pPr marL="914400" lvl="4" indent="-342900" algn="l">
-              <a:lnSpc>
-                <a:spcPct val="150000"/>
-              </a:lnSpc>
-              <a:buFont typeface="Arial" panose="020B0604020202020204" pitchFamily="34" charset="0"/>
-              <a:buChar char="•"/>
-            </a:pPr>
-            <a:r>
-              <a:rPr lang="en-US" altLang="en-IN" sz="2000">
-                <a:solidFill>
-                  <a:schemeClr val="bg1"/>
-                </a:solidFill>
-                <a:latin typeface="Calibri" panose="020F0502020204030204" charset="0"/>
-                <a:cs typeface="Calibri" panose="020F0502020204030204" charset="0"/>
-                <a:sym typeface="+mn-ea"/>
-              </a:rPr>
-              <a:t>Safely experiment with new ideas </a:t>
-            </a:r>
-            <a:endParaRPr lang="en-US" altLang="en-IN" sz="2000" b="1">
-              <a:solidFill>
-                <a:schemeClr val="accent1"/>
-              </a:solidFill>
-              <a:effectLst>
-                <a:outerShdw blurRad="38100" dist="25400" dir="5400000" algn="ctr" rotWithShape="0">
-                  <a:srgbClr val="6E747A">
-                    <a:alpha val="43000"/>
-                  </a:srgbClr>
-                </a:outerShdw>
-              </a:effectLst>
-              <a:latin typeface="Times New Roman" panose="02020603050405020304" charset="0"/>
-              <a:cs typeface="Times New Roman" panose="02020603050405020304" charset="0"/>
-              <a:sym typeface="+mn-ea"/>
-            </a:endParaRPr>
-          </a:p>
-          <a:p>
-            <a:pPr lvl="1" algn="l">
-              <a:lnSpc>
-                <a:spcPct val="150000"/>
-              </a:lnSpc>
-              <a:buFont typeface="Arial" panose="020B0604020202020204" pitchFamily="34" charset="0"/>
-            </a:pPr>
-            <a:endParaRPr lang="en-US" altLang="en-IN" sz="2000" b="1">
-              <a:solidFill>
-                <a:schemeClr val="bg1"/>
-              </a:solidFill>
-              <a:latin typeface="Calibri" panose="020F0502020204030204" charset="0"/>
-              <a:cs typeface="Calibri" panose="020F0502020204030204" charset="0"/>
               <a:sym typeface="+mn-ea"/>
             </a:endParaRPr>
           </a:p>
@@ -8906,6 +8149,1367 @@
           </a:p>
         </p:txBody>
       </p:sp>
+    </p:spTree>
+  </p:cSld>
+  <p:clrMapOvr>
+    <a:masterClrMapping/>
+  </p:clrMapOvr>
+</p:sld>
+</file>
+
+<file path=ppt/slides/slide17.xml><?xml version="1.0" encoding="utf-8"?>
+<p:sld xmlns:a="http://schemas.openxmlformats.org/drawingml/2006/main" xmlns:r="http://schemas.openxmlformats.org/officeDocument/2006/relationships" xmlns:p="http://schemas.openxmlformats.org/presentationml/2006/main">
+  <p:cSld>
+    <p:spTree>
+      <p:nvGrpSpPr>
+        <p:cNvPr id="1" name=""/>
+        <p:cNvGrpSpPr/>
+        <p:nvPr/>
+      </p:nvGrpSpPr>
+      <p:grpSpPr/>
+      <p:sp>
+        <p:nvSpPr>
+          <p:cNvPr id="6" name="Title 5"/>
+          <p:cNvSpPr>
+            <a:spLocks noGrp="1"/>
+          </p:cNvSpPr>
+          <p:nvPr>
+            <p:ph type="ctrTitle"/>
+          </p:nvPr>
+        </p:nvSpPr>
+        <p:spPr/>
+        <p:txBody>
+          <a:bodyPr/>
+          <a:p>
+            <a:endParaRPr lang="en-US"/>
+          </a:p>
+        </p:txBody>
+      </p:sp>
+      <p:sp>
+        <p:nvSpPr>
+          <p:cNvPr id="7" name="Subtitle 6"/>
+          <p:cNvSpPr>
+            <a:spLocks noGrp="1"/>
+          </p:cNvSpPr>
+          <p:nvPr>
+            <p:ph type="subTitle" idx="1"/>
+          </p:nvPr>
+        </p:nvSpPr>
+        <p:spPr>
+          <a:xfrm>
+            <a:off x="904240" y="2855595"/>
+            <a:ext cx="5123815" cy="3657600"/>
+          </a:xfrm>
+          <a:solidFill>
+            <a:schemeClr val="bg2">
+              <a:lumMod val="25000"/>
+            </a:schemeClr>
+          </a:solidFill>
+        </p:spPr>
+        <p:txBody>
+          <a:bodyPr>
+            <a:normAutofit lnSpcReduction="20000"/>
+          </a:bodyPr>
+          <a:p>
+            <a:pPr algn="l">
+              <a:buFont typeface="Arial" panose="020B0604020202020204" pitchFamily="34" charset="0"/>
+            </a:pPr>
+            <a:endParaRPr lang="en-IN" altLang="en-US" sz="2095">
+              <a:solidFill>
+                <a:schemeClr val="bg1"/>
+              </a:solidFill>
+              <a:latin typeface="Calibri" panose="020F0502020204030204" charset="0"/>
+              <a:cs typeface="Calibri" panose="020F0502020204030204" charset="0"/>
+              <a:sym typeface="+mn-ea"/>
+            </a:endParaRPr>
+          </a:p>
+          <a:p>
+            <a:pPr marL="342900" indent="-342900" algn="l">
+              <a:buFont typeface="Arial" panose="020B0604020202020204" pitchFamily="34" charset="0"/>
+              <a:buChar char="•"/>
+            </a:pPr>
+            <a:r>
+              <a:rPr lang="en-IN" altLang="en-US" sz="2800">
+                <a:solidFill>
+                  <a:schemeClr val="bg1"/>
+                </a:solidFill>
+                <a:latin typeface="Calibri" panose="020F0502020204030204" charset="0"/>
+                <a:cs typeface="Calibri" panose="020F0502020204030204" charset="0"/>
+                <a:sym typeface="+mn-ea"/>
+              </a:rPr>
+              <a:t>Not a dedicated tool to view the changes</a:t>
+            </a:r>
+            <a:endParaRPr lang="en-IN" altLang="en-US" sz="2800">
+              <a:solidFill>
+                <a:schemeClr val="bg1"/>
+              </a:solidFill>
+              <a:latin typeface="Calibri" panose="020F0502020204030204" charset="0"/>
+              <a:cs typeface="Calibri" panose="020F0502020204030204" charset="0"/>
+              <a:sym typeface="+mn-ea"/>
+            </a:endParaRPr>
+          </a:p>
+          <a:p>
+            <a:pPr marL="342900" indent="-342900" algn="l">
+              <a:buFont typeface="Arial" panose="020B0604020202020204" pitchFamily="34" charset="0"/>
+              <a:buChar char="•"/>
+            </a:pPr>
+            <a:endParaRPr lang="en-IN" altLang="en-US" sz="2800">
+              <a:solidFill>
+                <a:schemeClr val="bg1"/>
+              </a:solidFill>
+              <a:latin typeface="Calibri" panose="020F0502020204030204" charset="0"/>
+              <a:cs typeface="Calibri" panose="020F0502020204030204" charset="0"/>
+              <a:sym typeface="+mn-ea"/>
+            </a:endParaRPr>
+          </a:p>
+          <a:p>
+            <a:pPr marL="342900" indent="-342900" algn="l">
+              <a:buFont typeface="Arial" panose="020B0604020202020204" pitchFamily="34" charset="0"/>
+              <a:buChar char="•"/>
+            </a:pPr>
+            <a:r>
+              <a:rPr lang="en-IN" altLang="en-US" sz="2800">
+                <a:solidFill>
+                  <a:schemeClr val="bg1"/>
+                </a:solidFill>
+                <a:latin typeface="Calibri" panose="020F0502020204030204" charset="0"/>
+                <a:cs typeface="Calibri" panose="020F0502020204030204" charset="0"/>
+                <a:sym typeface="+mn-ea"/>
+              </a:rPr>
+              <a:t>Not a User friendly GUI</a:t>
+            </a:r>
+            <a:endParaRPr lang="en-IN" altLang="en-US" sz="2800">
+              <a:solidFill>
+                <a:schemeClr val="bg1"/>
+              </a:solidFill>
+              <a:latin typeface="Calibri" panose="020F0502020204030204" charset="0"/>
+              <a:cs typeface="Calibri" panose="020F0502020204030204" charset="0"/>
+              <a:sym typeface="+mn-ea"/>
+            </a:endParaRPr>
+          </a:p>
+          <a:p>
+            <a:pPr marL="342900" indent="-342900" algn="l">
+              <a:buFont typeface="Arial" panose="020B0604020202020204" pitchFamily="34" charset="0"/>
+              <a:buChar char="•"/>
+            </a:pPr>
+            <a:r>
+              <a:rPr lang="en-IN" altLang="en-US" sz="2800">
+                <a:solidFill>
+                  <a:schemeClr val="bg1"/>
+                </a:solidFill>
+                <a:latin typeface="Calibri" panose="020F0502020204030204" charset="0"/>
+                <a:cs typeface="Calibri" panose="020F0502020204030204" charset="0"/>
+                <a:sym typeface="+mn-ea"/>
+              </a:rPr>
+              <a:t>Unable to view the changes before commit</a:t>
+            </a:r>
+            <a:endParaRPr lang="en-IN" altLang="en-US" sz="2800">
+              <a:solidFill>
+                <a:schemeClr val="bg1"/>
+              </a:solidFill>
+              <a:latin typeface="Calibri" panose="020F0502020204030204" charset="0"/>
+              <a:cs typeface="Calibri" panose="020F0502020204030204" charset="0"/>
+              <a:sym typeface="+mn-ea"/>
+            </a:endParaRPr>
+          </a:p>
+          <a:p>
+            <a:pPr marL="342900" indent="-342900" algn="l">
+              <a:buFont typeface="Arial" panose="020B0604020202020204" pitchFamily="34" charset="0"/>
+              <a:buChar char="•"/>
+            </a:pPr>
+            <a:r>
+              <a:rPr lang="en-IN" altLang="en-US" sz="2800">
+                <a:solidFill>
+                  <a:schemeClr val="bg1"/>
+                </a:solidFill>
+                <a:latin typeface="Calibri" panose="020F0502020204030204" charset="0"/>
+                <a:cs typeface="Calibri" panose="020F0502020204030204" charset="0"/>
+                <a:sym typeface="+mn-ea"/>
+              </a:rPr>
+              <a:t>Don’t have Mobile app</a:t>
+            </a:r>
+            <a:endParaRPr lang="en-IN" altLang="en-US" sz="2800">
+              <a:solidFill>
+                <a:schemeClr val="bg1"/>
+              </a:solidFill>
+              <a:latin typeface="Calibri" panose="020F0502020204030204" charset="0"/>
+              <a:cs typeface="Calibri" panose="020F0502020204030204" charset="0"/>
+              <a:sym typeface="+mn-ea"/>
+            </a:endParaRPr>
+          </a:p>
+          <a:p>
+            <a:pPr marL="342900" indent="-342900" algn="l">
+              <a:buFont typeface="Arial" panose="020B0604020202020204" pitchFamily="34" charset="0"/>
+              <a:buChar char="•"/>
+            </a:pPr>
+            <a:endParaRPr lang="en-IN" altLang="en-US" sz="2800">
+              <a:solidFill>
+                <a:schemeClr val="bg1"/>
+              </a:solidFill>
+              <a:latin typeface="Calibri" panose="020F0502020204030204" charset="0"/>
+              <a:cs typeface="Calibri" panose="020F0502020204030204" charset="0"/>
+              <a:sym typeface="+mn-ea"/>
+            </a:endParaRPr>
+          </a:p>
+        </p:txBody>
+      </p:sp>
+      <p:sp>
+        <p:nvSpPr>
+          <p:cNvPr id="3" name="Subtitle 6"/>
+          <p:cNvSpPr>
+            <a:spLocks noGrp="1"/>
+          </p:cNvSpPr>
+          <p:nvPr/>
+        </p:nvSpPr>
+        <p:spPr>
+          <a:xfrm>
+            <a:off x="904240" y="855345"/>
+            <a:ext cx="10545445" cy="1082675"/>
+          </a:xfrm>
+          <a:prstGeom prst="rect">
+            <a:avLst/>
+          </a:prstGeom>
+          <a:solidFill>
+            <a:schemeClr val="bg2">
+              <a:lumMod val="25000"/>
+            </a:schemeClr>
+          </a:solidFill>
+        </p:spPr>
+        <p:txBody>
+          <a:bodyPr vert="horz" lIns="91440" tIns="45720" rIns="91440" bIns="45720" rtlCol="0">
+            <a:normAutofit/>
+          </a:bodyPr>
+          <a:lstStyle>
+            <a:lvl1pPr marL="0" indent="0" algn="ctr" defTabSz="914400" rtl="0" eaLnBrk="1" latinLnBrk="0" hangingPunct="1">
+              <a:lnSpc>
+                <a:spcPct val="90000"/>
+              </a:lnSpc>
+              <a:spcBef>
+                <a:spcPts val="1000"/>
+              </a:spcBef>
+              <a:buFont typeface="Arial" panose="020B0604020202020204" pitchFamily="34" charset="0"/>
+              <a:buNone/>
+              <a:defRPr sz="2400" kern="1200">
+                <a:solidFill>
+                  <a:schemeClr val="tx1"/>
+                </a:solidFill>
+                <a:latin typeface="+mn-lt"/>
+                <a:ea typeface="+mn-ea"/>
+                <a:cs typeface="+mn-cs"/>
+              </a:defRPr>
+            </a:lvl1pPr>
+            <a:lvl2pPr marL="457200" indent="0" algn="ctr" defTabSz="914400" rtl="0" eaLnBrk="1" latinLnBrk="0" hangingPunct="1">
+              <a:lnSpc>
+                <a:spcPct val="90000"/>
+              </a:lnSpc>
+              <a:spcBef>
+                <a:spcPts val="500"/>
+              </a:spcBef>
+              <a:buFont typeface="Arial" panose="020B0604020202020204" pitchFamily="34" charset="0"/>
+              <a:buNone/>
+              <a:defRPr sz="2000" kern="1200">
+                <a:solidFill>
+                  <a:schemeClr val="tx1"/>
+                </a:solidFill>
+                <a:latin typeface="+mn-lt"/>
+                <a:ea typeface="+mn-ea"/>
+                <a:cs typeface="+mn-cs"/>
+              </a:defRPr>
+            </a:lvl2pPr>
+            <a:lvl3pPr marL="914400" indent="0" algn="ctr" defTabSz="914400" rtl="0" eaLnBrk="1" latinLnBrk="0" hangingPunct="1">
+              <a:lnSpc>
+                <a:spcPct val="90000"/>
+              </a:lnSpc>
+              <a:spcBef>
+                <a:spcPts val="500"/>
+              </a:spcBef>
+              <a:buFont typeface="Arial" panose="020B0604020202020204" pitchFamily="34" charset="0"/>
+              <a:buNone/>
+              <a:defRPr sz="1800" kern="1200">
+                <a:solidFill>
+                  <a:schemeClr val="tx1"/>
+                </a:solidFill>
+                <a:latin typeface="+mn-lt"/>
+                <a:ea typeface="+mn-ea"/>
+                <a:cs typeface="+mn-cs"/>
+              </a:defRPr>
+            </a:lvl3pPr>
+            <a:lvl4pPr marL="1371600" indent="0" algn="ctr" defTabSz="914400" rtl="0" eaLnBrk="1" latinLnBrk="0" hangingPunct="1">
+              <a:lnSpc>
+                <a:spcPct val="90000"/>
+              </a:lnSpc>
+              <a:spcBef>
+                <a:spcPts val="500"/>
+              </a:spcBef>
+              <a:buFont typeface="Arial" panose="020B0604020202020204" pitchFamily="34" charset="0"/>
+              <a:buNone/>
+              <a:defRPr sz="1600" kern="1200">
+                <a:solidFill>
+                  <a:schemeClr val="tx1"/>
+                </a:solidFill>
+                <a:latin typeface="+mn-lt"/>
+                <a:ea typeface="+mn-ea"/>
+                <a:cs typeface="+mn-cs"/>
+              </a:defRPr>
+            </a:lvl4pPr>
+            <a:lvl5pPr marL="1828800" indent="0" algn="ctr" defTabSz="914400" rtl="0" eaLnBrk="1" latinLnBrk="0" hangingPunct="1">
+              <a:lnSpc>
+                <a:spcPct val="90000"/>
+              </a:lnSpc>
+              <a:spcBef>
+                <a:spcPts val="500"/>
+              </a:spcBef>
+              <a:buFont typeface="Arial" panose="020B0604020202020204" pitchFamily="34" charset="0"/>
+              <a:buNone/>
+              <a:defRPr sz="1600" kern="1200">
+                <a:solidFill>
+                  <a:schemeClr val="tx1"/>
+                </a:solidFill>
+                <a:latin typeface="+mn-lt"/>
+                <a:ea typeface="+mn-ea"/>
+                <a:cs typeface="+mn-cs"/>
+              </a:defRPr>
+            </a:lvl5pPr>
+            <a:lvl6pPr marL="2286000" indent="0" algn="ctr" defTabSz="914400" rtl="0" eaLnBrk="1" latinLnBrk="0" hangingPunct="1">
+              <a:lnSpc>
+                <a:spcPct val="90000"/>
+              </a:lnSpc>
+              <a:spcBef>
+                <a:spcPts val="500"/>
+              </a:spcBef>
+              <a:buFont typeface="Arial" panose="020B0604020202020204" pitchFamily="34" charset="0"/>
+              <a:buNone/>
+              <a:defRPr sz="1600" kern="1200">
+                <a:solidFill>
+                  <a:schemeClr val="tx1"/>
+                </a:solidFill>
+                <a:latin typeface="+mn-lt"/>
+                <a:ea typeface="+mn-ea"/>
+                <a:cs typeface="+mn-cs"/>
+              </a:defRPr>
+            </a:lvl6pPr>
+            <a:lvl7pPr marL="2743200" indent="0" algn="ctr" defTabSz="914400" rtl="0" eaLnBrk="1" latinLnBrk="0" hangingPunct="1">
+              <a:lnSpc>
+                <a:spcPct val="90000"/>
+              </a:lnSpc>
+              <a:spcBef>
+                <a:spcPts val="500"/>
+              </a:spcBef>
+              <a:buFont typeface="Arial" panose="020B0604020202020204" pitchFamily="34" charset="0"/>
+              <a:buNone/>
+              <a:defRPr sz="1600" kern="1200">
+                <a:solidFill>
+                  <a:schemeClr val="tx1"/>
+                </a:solidFill>
+                <a:latin typeface="+mn-lt"/>
+                <a:ea typeface="+mn-ea"/>
+                <a:cs typeface="+mn-cs"/>
+              </a:defRPr>
+            </a:lvl7pPr>
+            <a:lvl8pPr marL="3200400" indent="0" algn="ctr" defTabSz="914400" rtl="0" eaLnBrk="1" latinLnBrk="0" hangingPunct="1">
+              <a:lnSpc>
+                <a:spcPct val="90000"/>
+              </a:lnSpc>
+              <a:spcBef>
+                <a:spcPts val="500"/>
+              </a:spcBef>
+              <a:buFont typeface="Arial" panose="020B0604020202020204" pitchFamily="34" charset="0"/>
+              <a:buNone/>
+              <a:defRPr sz="1600" kern="1200">
+                <a:solidFill>
+                  <a:schemeClr val="tx1"/>
+                </a:solidFill>
+                <a:latin typeface="+mn-lt"/>
+                <a:ea typeface="+mn-ea"/>
+                <a:cs typeface="+mn-cs"/>
+              </a:defRPr>
+            </a:lvl8pPr>
+            <a:lvl9pPr marL="3657600" indent="0" algn="ctr" defTabSz="914400" rtl="0" eaLnBrk="1" latinLnBrk="0" hangingPunct="1">
+              <a:lnSpc>
+                <a:spcPct val="90000"/>
+              </a:lnSpc>
+              <a:spcBef>
+                <a:spcPts val="500"/>
+              </a:spcBef>
+              <a:buFont typeface="Arial" panose="020B0604020202020204" pitchFamily="34" charset="0"/>
+              <a:buNone/>
+              <a:defRPr sz="1600" kern="1200">
+                <a:solidFill>
+                  <a:schemeClr val="tx1"/>
+                </a:solidFill>
+                <a:latin typeface="+mn-lt"/>
+                <a:ea typeface="+mn-ea"/>
+                <a:cs typeface="+mn-cs"/>
+              </a:defRPr>
+            </a:lvl9pPr>
+          </a:lstStyle>
+          <a:p>
+            <a:pPr algn="l">
+              <a:buFont typeface="Arial" panose="020B0604020202020204" pitchFamily="34" charset="0"/>
+            </a:pPr>
+            <a:r>
+              <a:rPr lang="en-IN" altLang="en-US" sz="2095">
+                <a:solidFill>
+                  <a:schemeClr val="bg1"/>
+                </a:solidFill>
+                <a:latin typeface="Times New Roman" panose="02020603050405020304" charset="0"/>
+                <a:cs typeface="Times New Roman" panose="02020603050405020304" charset="0"/>
+                <a:sym typeface="+mn-ea"/>
+              </a:rPr>
+              <a:t>	</a:t>
+            </a:r>
+            <a:endParaRPr lang="en-IN" altLang="en-US" sz="2095">
+              <a:solidFill>
+                <a:schemeClr val="bg1"/>
+              </a:solidFill>
+              <a:latin typeface="Times New Roman" panose="02020603050405020304" charset="0"/>
+              <a:cs typeface="Times New Roman" panose="02020603050405020304" charset="0"/>
+              <a:sym typeface="+mn-ea"/>
+            </a:endParaRPr>
+          </a:p>
+          <a:p>
+            <a:pPr algn="l">
+              <a:buFont typeface="Arial" panose="020B0604020202020204" pitchFamily="34" charset="0"/>
+            </a:pPr>
+            <a:r>
+              <a:rPr lang="en-IN" altLang="en-US" sz="2095">
+                <a:solidFill>
+                  <a:schemeClr val="bg1"/>
+                </a:solidFill>
+                <a:latin typeface="Times New Roman" panose="02020603050405020304" charset="0"/>
+                <a:cs typeface="Times New Roman" panose="02020603050405020304" charset="0"/>
+                <a:sym typeface="+mn-ea"/>
+              </a:rPr>
+              <a:t>				      </a:t>
+            </a:r>
+            <a:r>
+              <a:rPr lang="en-IN" altLang="en-US" b="1">
+                <a:solidFill>
+                  <a:schemeClr val="accent1"/>
+                </a:solidFill>
+                <a:effectLst>
+                  <a:outerShdw blurRad="38100" dist="25400" dir="5400000" algn="ctr" rotWithShape="0">
+                    <a:srgbClr val="6E747A">
+                      <a:alpha val="43000"/>
+                    </a:srgbClr>
+                  </a:outerShdw>
+                </a:effectLst>
+                <a:latin typeface="Times New Roman" panose="02020603050405020304" charset="0"/>
+                <a:cs typeface="Times New Roman" panose="02020603050405020304" charset="0"/>
+                <a:sym typeface="+mn-ea"/>
+              </a:rPr>
+              <a:t>DIFFERENTS</a:t>
+            </a:r>
+            <a:endParaRPr lang="en-IN" altLang="en-US" sz="3600" b="1">
+              <a:solidFill>
+                <a:schemeClr val="accent1"/>
+              </a:solidFill>
+              <a:effectLst>
+                <a:outerShdw blurRad="38100" dist="25400" dir="5400000" algn="ctr" rotWithShape="0">
+                  <a:srgbClr val="6E747A">
+                    <a:alpha val="43000"/>
+                  </a:srgbClr>
+                </a:outerShdw>
+              </a:effectLst>
+              <a:latin typeface="Times New Roman" panose="02020603050405020304" charset="0"/>
+              <a:cs typeface="Times New Roman" panose="02020603050405020304" charset="0"/>
+              <a:sym typeface="+mn-ea"/>
+            </a:endParaRPr>
+          </a:p>
+        </p:txBody>
+      </p:sp>
+      <p:sp>
+        <p:nvSpPr>
+          <p:cNvPr id="4" name="Subtitle 6"/>
+          <p:cNvSpPr>
+            <a:spLocks noGrp="1"/>
+          </p:cNvSpPr>
+          <p:nvPr/>
+        </p:nvSpPr>
+        <p:spPr>
+          <a:xfrm>
+            <a:off x="6259195" y="2855595"/>
+            <a:ext cx="5274310" cy="3658235"/>
+          </a:xfrm>
+          <a:prstGeom prst="rect">
+            <a:avLst/>
+          </a:prstGeom>
+          <a:solidFill>
+            <a:schemeClr val="bg2">
+              <a:lumMod val="25000"/>
+            </a:schemeClr>
+          </a:solidFill>
+        </p:spPr>
+        <p:txBody>
+          <a:bodyPr vert="horz" lIns="91440" tIns="45720" rIns="91440" bIns="45720" rtlCol="0">
+            <a:normAutofit/>
+          </a:bodyPr>
+          <a:lstStyle>
+            <a:lvl1pPr marL="0" indent="0" algn="ctr" defTabSz="914400" rtl="0" eaLnBrk="1" latinLnBrk="0" hangingPunct="1">
+              <a:lnSpc>
+                <a:spcPct val="90000"/>
+              </a:lnSpc>
+              <a:spcBef>
+                <a:spcPts val="1000"/>
+              </a:spcBef>
+              <a:buFont typeface="Arial" panose="020B0604020202020204" pitchFamily="34" charset="0"/>
+              <a:buNone/>
+              <a:defRPr sz="2400" kern="1200">
+                <a:solidFill>
+                  <a:schemeClr val="tx1"/>
+                </a:solidFill>
+                <a:latin typeface="+mn-lt"/>
+                <a:ea typeface="+mn-ea"/>
+                <a:cs typeface="+mn-cs"/>
+              </a:defRPr>
+            </a:lvl1pPr>
+            <a:lvl2pPr marL="457200" indent="0" algn="ctr" defTabSz="914400" rtl="0" eaLnBrk="1" latinLnBrk="0" hangingPunct="1">
+              <a:lnSpc>
+                <a:spcPct val="90000"/>
+              </a:lnSpc>
+              <a:spcBef>
+                <a:spcPts val="500"/>
+              </a:spcBef>
+              <a:buFont typeface="Arial" panose="020B0604020202020204" pitchFamily="34" charset="0"/>
+              <a:buNone/>
+              <a:defRPr sz="2000" kern="1200">
+                <a:solidFill>
+                  <a:schemeClr val="tx1"/>
+                </a:solidFill>
+                <a:latin typeface="+mn-lt"/>
+                <a:ea typeface="+mn-ea"/>
+                <a:cs typeface="+mn-cs"/>
+              </a:defRPr>
+            </a:lvl2pPr>
+            <a:lvl3pPr marL="914400" indent="0" algn="ctr" defTabSz="914400" rtl="0" eaLnBrk="1" latinLnBrk="0" hangingPunct="1">
+              <a:lnSpc>
+                <a:spcPct val="90000"/>
+              </a:lnSpc>
+              <a:spcBef>
+                <a:spcPts val="500"/>
+              </a:spcBef>
+              <a:buFont typeface="Arial" panose="020B0604020202020204" pitchFamily="34" charset="0"/>
+              <a:buNone/>
+              <a:defRPr sz="1800" kern="1200">
+                <a:solidFill>
+                  <a:schemeClr val="tx1"/>
+                </a:solidFill>
+                <a:latin typeface="+mn-lt"/>
+                <a:ea typeface="+mn-ea"/>
+                <a:cs typeface="+mn-cs"/>
+              </a:defRPr>
+            </a:lvl3pPr>
+            <a:lvl4pPr marL="1371600" indent="0" algn="ctr" defTabSz="914400" rtl="0" eaLnBrk="1" latinLnBrk="0" hangingPunct="1">
+              <a:lnSpc>
+                <a:spcPct val="90000"/>
+              </a:lnSpc>
+              <a:spcBef>
+                <a:spcPts val="500"/>
+              </a:spcBef>
+              <a:buFont typeface="Arial" panose="020B0604020202020204" pitchFamily="34" charset="0"/>
+              <a:buNone/>
+              <a:defRPr sz="1600" kern="1200">
+                <a:solidFill>
+                  <a:schemeClr val="tx1"/>
+                </a:solidFill>
+                <a:latin typeface="+mn-lt"/>
+                <a:ea typeface="+mn-ea"/>
+                <a:cs typeface="+mn-cs"/>
+              </a:defRPr>
+            </a:lvl4pPr>
+            <a:lvl5pPr marL="1828800" indent="0" algn="ctr" defTabSz="914400" rtl="0" eaLnBrk="1" latinLnBrk="0" hangingPunct="1">
+              <a:lnSpc>
+                <a:spcPct val="90000"/>
+              </a:lnSpc>
+              <a:spcBef>
+                <a:spcPts val="500"/>
+              </a:spcBef>
+              <a:buFont typeface="Arial" panose="020B0604020202020204" pitchFamily="34" charset="0"/>
+              <a:buNone/>
+              <a:defRPr sz="1600" kern="1200">
+                <a:solidFill>
+                  <a:schemeClr val="tx1"/>
+                </a:solidFill>
+                <a:latin typeface="+mn-lt"/>
+                <a:ea typeface="+mn-ea"/>
+                <a:cs typeface="+mn-cs"/>
+              </a:defRPr>
+            </a:lvl5pPr>
+            <a:lvl6pPr marL="2286000" indent="0" algn="ctr" defTabSz="914400" rtl="0" eaLnBrk="1" latinLnBrk="0" hangingPunct="1">
+              <a:lnSpc>
+                <a:spcPct val="90000"/>
+              </a:lnSpc>
+              <a:spcBef>
+                <a:spcPts val="500"/>
+              </a:spcBef>
+              <a:buFont typeface="Arial" panose="020B0604020202020204" pitchFamily="34" charset="0"/>
+              <a:buNone/>
+              <a:defRPr sz="1600" kern="1200">
+                <a:solidFill>
+                  <a:schemeClr val="tx1"/>
+                </a:solidFill>
+                <a:latin typeface="+mn-lt"/>
+                <a:ea typeface="+mn-ea"/>
+                <a:cs typeface="+mn-cs"/>
+              </a:defRPr>
+            </a:lvl6pPr>
+            <a:lvl7pPr marL="2743200" indent="0" algn="ctr" defTabSz="914400" rtl="0" eaLnBrk="1" latinLnBrk="0" hangingPunct="1">
+              <a:lnSpc>
+                <a:spcPct val="90000"/>
+              </a:lnSpc>
+              <a:spcBef>
+                <a:spcPts val="500"/>
+              </a:spcBef>
+              <a:buFont typeface="Arial" panose="020B0604020202020204" pitchFamily="34" charset="0"/>
+              <a:buNone/>
+              <a:defRPr sz="1600" kern="1200">
+                <a:solidFill>
+                  <a:schemeClr val="tx1"/>
+                </a:solidFill>
+                <a:latin typeface="+mn-lt"/>
+                <a:ea typeface="+mn-ea"/>
+                <a:cs typeface="+mn-cs"/>
+              </a:defRPr>
+            </a:lvl7pPr>
+            <a:lvl8pPr marL="3200400" indent="0" algn="ctr" defTabSz="914400" rtl="0" eaLnBrk="1" latinLnBrk="0" hangingPunct="1">
+              <a:lnSpc>
+                <a:spcPct val="90000"/>
+              </a:lnSpc>
+              <a:spcBef>
+                <a:spcPts val="500"/>
+              </a:spcBef>
+              <a:buFont typeface="Arial" panose="020B0604020202020204" pitchFamily="34" charset="0"/>
+              <a:buNone/>
+              <a:defRPr sz="1600" kern="1200">
+                <a:solidFill>
+                  <a:schemeClr val="tx1"/>
+                </a:solidFill>
+                <a:latin typeface="+mn-lt"/>
+                <a:ea typeface="+mn-ea"/>
+                <a:cs typeface="+mn-cs"/>
+              </a:defRPr>
+            </a:lvl8pPr>
+            <a:lvl9pPr marL="3657600" indent="0" algn="ctr" defTabSz="914400" rtl="0" eaLnBrk="1" latinLnBrk="0" hangingPunct="1">
+              <a:lnSpc>
+                <a:spcPct val="90000"/>
+              </a:lnSpc>
+              <a:spcBef>
+                <a:spcPts val="500"/>
+              </a:spcBef>
+              <a:buFont typeface="Arial" panose="020B0604020202020204" pitchFamily="34" charset="0"/>
+              <a:buNone/>
+              <a:defRPr sz="1600" kern="1200">
+                <a:solidFill>
+                  <a:schemeClr val="tx1"/>
+                </a:solidFill>
+                <a:latin typeface="+mn-lt"/>
+                <a:ea typeface="+mn-ea"/>
+                <a:cs typeface="+mn-cs"/>
+              </a:defRPr>
+            </a:lvl9pPr>
+          </a:lstStyle>
+          <a:p>
+            <a:pPr marL="342900" indent="-342900" algn="l">
+              <a:buFont typeface="Arial" panose="020B0604020202020204" pitchFamily="34" charset="0"/>
+              <a:buChar char="•"/>
+            </a:pPr>
+            <a:endParaRPr lang="en-IN" altLang="en-US" sz="2800">
+              <a:solidFill>
+                <a:schemeClr val="bg1"/>
+              </a:solidFill>
+              <a:latin typeface="Calibri" panose="020F0502020204030204" charset="0"/>
+              <a:cs typeface="Calibri" panose="020F0502020204030204" charset="0"/>
+              <a:sym typeface="+mn-ea"/>
+            </a:endParaRPr>
+          </a:p>
+          <a:p>
+            <a:pPr marL="342900" indent="-342900" algn="l">
+              <a:buFont typeface="Arial" panose="020B0604020202020204" pitchFamily="34" charset="0"/>
+              <a:buChar char="•"/>
+            </a:pPr>
+            <a:r>
+              <a:rPr lang="en-IN" altLang="en-US" sz="2800">
+                <a:solidFill>
+                  <a:schemeClr val="bg1"/>
+                </a:solidFill>
+                <a:latin typeface="Calibri" panose="020F0502020204030204" charset="0"/>
+                <a:cs typeface="Calibri" panose="020F0502020204030204" charset="0"/>
+                <a:sym typeface="+mn-ea"/>
+              </a:rPr>
+              <a:t>Dedicated tool named Github Desktop</a:t>
+            </a:r>
+            <a:endParaRPr lang="en-IN" altLang="en-US" sz="2800">
+              <a:solidFill>
+                <a:schemeClr val="bg1"/>
+              </a:solidFill>
+              <a:latin typeface="Calibri" panose="020F0502020204030204" charset="0"/>
+              <a:cs typeface="Calibri" panose="020F0502020204030204" charset="0"/>
+              <a:sym typeface="+mn-ea"/>
+            </a:endParaRPr>
+          </a:p>
+          <a:p>
+            <a:pPr marL="342900" indent="-342900" algn="l">
+              <a:buFont typeface="Arial" panose="020B0604020202020204" pitchFamily="34" charset="0"/>
+              <a:buChar char="•"/>
+            </a:pPr>
+            <a:r>
+              <a:rPr lang="en-IN" altLang="en-US" sz="2800">
+                <a:solidFill>
+                  <a:schemeClr val="bg1"/>
+                </a:solidFill>
+                <a:latin typeface="Calibri" panose="020F0502020204030204" charset="0"/>
+                <a:cs typeface="Calibri" panose="020F0502020204030204" charset="0"/>
+                <a:sym typeface="+mn-ea"/>
+              </a:rPr>
+              <a:t>User friendly GUI</a:t>
+            </a:r>
+            <a:endParaRPr lang="en-IN" altLang="en-US" sz="2800">
+              <a:solidFill>
+                <a:schemeClr val="bg1"/>
+              </a:solidFill>
+              <a:latin typeface="Calibri" panose="020F0502020204030204" charset="0"/>
+              <a:cs typeface="Calibri" panose="020F0502020204030204" charset="0"/>
+              <a:sym typeface="+mn-ea"/>
+            </a:endParaRPr>
+          </a:p>
+          <a:p>
+            <a:pPr marL="342900" indent="-342900" algn="l">
+              <a:buFont typeface="Arial" panose="020B0604020202020204" pitchFamily="34" charset="0"/>
+              <a:buChar char="•"/>
+            </a:pPr>
+            <a:r>
+              <a:rPr lang="en-IN" altLang="en-US" sz="2800">
+                <a:solidFill>
+                  <a:schemeClr val="bg1"/>
+                </a:solidFill>
+                <a:latin typeface="Calibri" panose="020F0502020204030204" charset="0"/>
+                <a:cs typeface="Calibri" panose="020F0502020204030204" charset="0"/>
+                <a:sym typeface="+mn-ea"/>
+              </a:rPr>
+              <a:t>We can view the changes before commit</a:t>
+            </a:r>
+            <a:endParaRPr lang="en-IN" altLang="en-US" sz="2800">
+              <a:solidFill>
+                <a:schemeClr val="bg1"/>
+              </a:solidFill>
+              <a:latin typeface="Calibri" panose="020F0502020204030204" charset="0"/>
+              <a:cs typeface="Calibri" panose="020F0502020204030204" charset="0"/>
+              <a:sym typeface="+mn-ea"/>
+            </a:endParaRPr>
+          </a:p>
+          <a:p>
+            <a:pPr marL="342900" indent="-342900" algn="l">
+              <a:buFont typeface="Arial" panose="020B0604020202020204" pitchFamily="34" charset="0"/>
+              <a:buChar char="•"/>
+            </a:pPr>
+            <a:r>
+              <a:rPr lang="en-IN" altLang="en-US" sz="2800">
+                <a:solidFill>
+                  <a:schemeClr val="bg1"/>
+                </a:solidFill>
+                <a:latin typeface="Calibri" panose="020F0502020204030204" charset="0"/>
+                <a:cs typeface="Calibri" panose="020F0502020204030204" charset="0"/>
+                <a:sym typeface="+mn-ea"/>
+              </a:rPr>
+              <a:t>We can use in Mobile</a:t>
+            </a:r>
+            <a:endParaRPr lang="en-IN" altLang="en-US" sz="2800">
+              <a:solidFill>
+                <a:schemeClr val="bg1"/>
+              </a:solidFill>
+              <a:latin typeface="Calibri" panose="020F0502020204030204" charset="0"/>
+              <a:cs typeface="Calibri" panose="020F0502020204030204" charset="0"/>
+              <a:sym typeface="+mn-ea"/>
+            </a:endParaRPr>
+          </a:p>
+        </p:txBody>
+      </p:sp>
+      <p:sp>
+        <p:nvSpPr>
+          <p:cNvPr id="5" name="Subtitle 6"/>
+          <p:cNvSpPr>
+            <a:spLocks noGrp="1"/>
+          </p:cNvSpPr>
+          <p:nvPr/>
+        </p:nvSpPr>
+        <p:spPr>
+          <a:xfrm>
+            <a:off x="6259195" y="2007235"/>
+            <a:ext cx="5123815" cy="763270"/>
+          </a:xfrm>
+          <a:prstGeom prst="rect">
+            <a:avLst/>
+          </a:prstGeom>
+          <a:solidFill>
+            <a:schemeClr val="bg2">
+              <a:lumMod val="25000"/>
+            </a:schemeClr>
+          </a:solidFill>
+        </p:spPr>
+        <p:txBody>
+          <a:bodyPr vert="horz" lIns="91440" tIns="45720" rIns="91440" bIns="45720" rtlCol="0">
+            <a:normAutofit fontScale="60000"/>
+          </a:bodyPr>
+          <a:lstStyle>
+            <a:lvl1pPr marL="0" indent="0" algn="ctr" defTabSz="914400" rtl="0" eaLnBrk="1" latinLnBrk="0" hangingPunct="1">
+              <a:lnSpc>
+                <a:spcPct val="90000"/>
+              </a:lnSpc>
+              <a:spcBef>
+                <a:spcPts val="1000"/>
+              </a:spcBef>
+              <a:buFont typeface="Arial" panose="020B0604020202020204" pitchFamily="34" charset="0"/>
+              <a:buNone/>
+              <a:defRPr sz="2400" kern="1200">
+                <a:solidFill>
+                  <a:schemeClr val="tx1"/>
+                </a:solidFill>
+                <a:latin typeface="+mn-lt"/>
+                <a:ea typeface="+mn-ea"/>
+                <a:cs typeface="+mn-cs"/>
+              </a:defRPr>
+            </a:lvl1pPr>
+            <a:lvl2pPr marL="457200" indent="0" algn="ctr" defTabSz="914400" rtl="0" eaLnBrk="1" latinLnBrk="0" hangingPunct="1">
+              <a:lnSpc>
+                <a:spcPct val="90000"/>
+              </a:lnSpc>
+              <a:spcBef>
+                <a:spcPts val="500"/>
+              </a:spcBef>
+              <a:buFont typeface="Arial" panose="020B0604020202020204" pitchFamily="34" charset="0"/>
+              <a:buNone/>
+              <a:defRPr sz="2000" kern="1200">
+                <a:solidFill>
+                  <a:schemeClr val="tx1"/>
+                </a:solidFill>
+                <a:latin typeface="+mn-lt"/>
+                <a:ea typeface="+mn-ea"/>
+                <a:cs typeface="+mn-cs"/>
+              </a:defRPr>
+            </a:lvl2pPr>
+            <a:lvl3pPr marL="914400" indent="0" algn="ctr" defTabSz="914400" rtl="0" eaLnBrk="1" latinLnBrk="0" hangingPunct="1">
+              <a:lnSpc>
+                <a:spcPct val="90000"/>
+              </a:lnSpc>
+              <a:spcBef>
+                <a:spcPts val="500"/>
+              </a:spcBef>
+              <a:buFont typeface="Arial" panose="020B0604020202020204" pitchFamily="34" charset="0"/>
+              <a:buNone/>
+              <a:defRPr sz="1800" kern="1200">
+                <a:solidFill>
+                  <a:schemeClr val="tx1"/>
+                </a:solidFill>
+                <a:latin typeface="+mn-lt"/>
+                <a:ea typeface="+mn-ea"/>
+                <a:cs typeface="+mn-cs"/>
+              </a:defRPr>
+            </a:lvl3pPr>
+            <a:lvl4pPr marL="1371600" indent="0" algn="ctr" defTabSz="914400" rtl="0" eaLnBrk="1" latinLnBrk="0" hangingPunct="1">
+              <a:lnSpc>
+                <a:spcPct val="90000"/>
+              </a:lnSpc>
+              <a:spcBef>
+                <a:spcPts val="500"/>
+              </a:spcBef>
+              <a:buFont typeface="Arial" panose="020B0604020202020204" pitchFamily="34" charset="0"/>
+              <a:buNone/>
+              <a:defRPr sz="1600" kern="1200">
+                <a:solidFill>
+                  <a:schemeClr val="tx1"/>
+                </a:solidFill>
+                <a:latin typeface="+mn-lt"/>
+                <a:ea typeface="+mn-ea"/>
+                <a:cs typeface="+mn-cs"/>
+              </a:defRPr>
+            </a:lvl4pPr>
+            <a:lvl5pPr marL="1828800" indent="0" algn="ctr" defTabSz="914400" rtl="0" eaLnBrk="1" latinLnBrk="0" hangingPunct="1">
+              <a:lnSpc>
+                <a:spcPct val="90000"/>
+              </a:lnSpc>
+              <a:spcBef>
+                <a:spcPts val="500"/>
+              </a:spcBef>
+              <a:buFont typeface="Arial" panose="020B0604020202020204" pitchFamily="34" charset="0"/>
+              <a:buNone/>
+              <a:defRPr sz="1600" kern="1200">
+                <a:solidFill>
+                  <a:schemeClr val="tx1"/>
+                </a:solidFill>
+                <a:latin typeface="+mn-lt"/>
+                <a:ea typeface="+mn-ea"/>
+                <a:cs typeface="+mn-cs"/>
+              </a:defRPr>
+            </a:lvl5pPr>
+            <a:lvl6pPr marL="2286000" indent="0" algn="ctr" defTabSz="914400" rtl="0" eaLnBrk="1" latinLnBrk="0" hangingPunct="1">
+              <a:lnSpc>
+                <a:spcPct val="90000"/>
+              </a:lnSpc>
+              <a:spcBef>
+                <a:spcPts val="500"/>
+              </a:spcBef>
+              <a:buFont typeface="Arial" panose="020B0604020202020204" pitchFamily="34" charset="0"/>
+              <a:buNone/>
+              <a:defRPr sz="1600" kern="1200">
+                <a:solidFill>
+                  <a:schemeClr val="tx1"/>
+                </a:solidFill>
+                <a:latin typeface="+mn-lt"/>
+                <a:ea typeface="+mn-ea"/>
+                <a:cs typeface="+mn-cs"/>
+              </a:defRPr>
+            </a:lvl6pPr>
+            <a:lvl7pPr marL="2743200" indent="0" algn="ctr" defTabSz="914400" rtl="0" eaLnBrk="1" latinLnBrk="0" hangingPunct="1">
+              <a:lnSpc>
+                <a:spcPct val="90000"/>
+              </a:lnSpc>
+              <a:spcBef>
+                <a:spcPts val="500"/>
+              </a:spcBef>
+              <a:buFont typeface="Arial" panose="020B0604020202020204" pitchFamily="34" charset="0"/>
+              <a:buNone/>
+              <a:defRPr sz="1600" kern="1200">
+                <a:solidFill>
+                  <a:schemeClr val="tx1"/>
+                </a:solidFill>
+                <a:latin typeface="+mn-lt"/>
+                <a:ea typeface="+mn-ea"/>
+                <a:cs typeface="+mn-cs"/>
+              </a:defRPr>
+            </a:lvl7pPr>
+            <a:lvl8pPr marL="3200400" indent="0" algn="ctr" defTabSz="914400" rtl="0" eaLnBrk="1" latinLnBrk="0" hangingPunct="1">
+              <a:lnSpc>
+                <a:spcPct val="90000"/>
+              </a:lnSpc>
+              <a:spcBef>
+                <a:spcPts val="500"/>
+              </a:spcBef>
+              <a:buFont typeface="Arial" panose="020B0604020202020204" pitchFamily="34" charset="0"/>
+              <a:buNone/>
+              <a:defRPr sz="1600" kern="1200">
+                <a:solidFill>
+                  <a:schemeClr val="tx1"/>
+                </a:solidFill>
+                <a:latin typeface="+mn-lt"/>
+                <a:ea typeface="+mn-ea"/>
+                <a:cs typeface="+mn-cs"/>
+              </a:defRPr>
+            </a:lvl8pPr>
+            <a:lvl9pPr marL="3657600" indent="0" algn="ctr" defTabSz="914400" rtl="0" eaLnBrk="1" latinLnBrk="0" hangingPunct="1">
+              <a:lnSpc>
+                <a:spcPct val="90000"/>
+              </a:lnSpc>
+              <a:spcBef>
+                <a:spcPts val="500"/>
+              </a:spcBef>
+              <a:buFont typeface="Arial" panose="020B0604020202020204" pitchFamily="34" charset="0"/>
+              <a:buNone/>
+              <a:defRPr sz="1600" kern="1200">
+                <a:solidFill>
+                  <a:schemeClr val="tx1"/>
+                </a:solidFill>
+                <a:latin typeface="+mn-lt"/>
+                <a:ea typeface="+mn-ea"/>
+                <a:cs typeface="+mn-cs"/>
+              </a:defRPr>
+            </a:lvl9pPr>
+          </a:lstStyle>
+          <a:p>
+            <a:pPr algn="l">
+              <a:buFont typeface="Arial" panose="020B0604020202020204" pitchFamily="34" charset="0"/>
+            </a:pPr>
+            <a:r>
+              <a:rPr lang="en-IN" altLang="en-US" b="1">
+                <a:solidFill>
+                  <a:schemeClr val="bg1"/>
+                </a:solidFill>
+              </a:rPr>
+              <a:t>		</a:t>
+            </a:r>
+            <a:endParaRPr lang="en-IN" altLang="en-US" b="1">
+              <a:solidFill>
+                <a:schemeClr val="bg1"/>
+              </a:solidFill>
+            </a:endParaRPr>
+          </a:p>
+          <a:p>
+            <a:pPr algn="l">
+              <a:buFont typeface="Arial" panose="020B0604020202020204" pitchFamily="34" charset="0"/>
+            </a:pPr>
+            <a:r>
+              <a:rPr lang="en-IN" altLang="en-US" b="1">
+                <a:solidFill>
+                  <a:schemeClr val="bg1"/>
+                </a:solidFill>
+              </a:rPr>
+              <a:t>		    </a:t>
+            </a:r>
+            <a:r>
+              <a:rPr lang="en-IN" altLang="en-US" sz="3400" b="1">
+                <a:solidFill>
+                  <a:schemeClr val="accent1"/>
+                </a:solidFill>
+                <a:effectLst>
+                  <a:outerShdw blurRad="38100" dist="25400" dir="5400000" algn="ctr" rotWithShape="0">
+                    <a:srgbClr val="6E747A">
+                      <a:alpha val="43000"/>
+                    </a:srgbClr>
+                  </a:outerShdw>
+                </a:effectLst>
+                <a:latin typeface="Times New Roman" panose="02020603050405020304" charset="0"/>
+                <a:cs typeface="Times New Roman" panose="02020603050405020304" charset="0"/>
+                <a:sym typeface="+mn-ea"/>
+              </a:rPr>
+              <a:t>GitHub</a:t>
+            </a:r>
+            <a:endParaRPr lang="en-IN" altLang="en-US" sz="3400" b="1">
+              <a:solidFill>
+                <a:schemeClr val="accent1"/>
+              </a:solidFill>
+              <a:effectLst>
+                <a:outerShdw blurRad="38100" dist="25400" dir="5400000" algn="ctr" rotWithShape="0">
+                  <a:srgbClr val="6E747A">
+                    <a:alpha val="43000"/>
+                  </a:srgbClr>
+                </a:outerShdw>
+              </a:effectLst>
+              <a:latin typeface="Times New Roman" panose="02020603050405020304" charset="0"/>
+              <a:cs typeface="Times New Roman" panose="02020603050405020304" charset="0"/>
+              <a:sym typeface="+mn-ea"/>
+            </a:endParaRPr>
+          </a:p>
+        </p:txBody>
+      </p:sp>
+      <p:sp>
+        <p:nvSpPr>
+          <p:cNvPr id="8" name="Subtitle 6"/>
+          <p:cNvSpPr>
+            <a:spLocks noGrp="1"/>
+          </p:cNvSpPr>
+          <p:nvPr/>
+        </p:nvSpPr>
+        <p:spPr>
+          <a:xfrm>
+            <a:off x="904240" y="2007235"/>
+            <a:ext cx="5123815" cy="779780"/>
+          </a:xfrm>
+          <a:prstGeom prst="rect">
+            <a:avLst/>
+          </a:prstGeom>
+          <a:solidFill>
+            <a:schemeClr val="bg2">
+              <a:lumMod val="25000"/>
+            </a:schemeClr>
+          </a:solidFill>
+        </p:spPr>
+        <p:txBody>
+          <a:bodyPr vert="horz" lIns="91440" tIns="45720" rIns="91440" bIns="45720" rtlCol="0">
+            <a:normAutofit fontScale="60000"/>
+          </a:bodyPr>
+          <a:lstStyle>
+            <a:lvl1pPr marL="0" indent="0" algn="ctr" defTabSz="914400" rtl="0" eaLnBrk="1" latinLnBrk="0" hangingPunct="1">
+              <a:lnSpc>
+                <a:spcPct val="90000"/>
+              </a:lnSpc>
+              <a:spcBef>
+                <a:spcPts val="1000"/>
+              </a:spcBef>
+              <a:buFont typeface="Arial" panose="020B0604020202020204" pitchFamily="34" charset="0"/>
+              <a:buNone/>
+              <a:defRPr sz="2400" kern="1200">
+                <a:solidFill>
+                  <a:schemeClr val="tx1"/>
+                </a:solidFill>
+                <a:latin typeface="+mn-lt"/>
+                <a:ea typeface="+mn-ea"/>
+                <a:cs typeface="+mn-cs"/>
+              </a:defRPr>
+            </a:lvl1pPr>
+            <a:lvl2pPr marL="457200" indent="0" algn="ctr" defTabSz="914400" rtl="0" eaLnBrk="1" latinLnBrk="0" hangingPunct="1">
+              <a:lnSpc>
+                <a:spcPct val="90000"/>
+              </a:lnSpc>
+              <a:spcBef>
+                <a:spcPts val="500"/>
+              </a:spcBef>
+              <a:buFont typeface="Arial" panose="020B0604020202020204" pitchFamily="34" charset="0"/>
+              <a:buNone/>
+              <a:defRPr sz="2000" kern="1200">
+                <a:solidFill>
+                  <a:schemeClr val="tx1"/>
+                </a:solidFill>
+                <a:latin typeface="+mn-lt"/>
+                <a:ea typeface="+mn-ea"/>
+                <a:cs typeface="+mn-cs"/>
+              </a:defRPr>
+            </a:lvl2pPr>
+            <a:lvl3pPr marL="914400" indent="0" algn="ctr" defTabSz="914400" rtl="0" eaLnBrk="1" latinLnBrk="0" hangingPunct="1">
+              <a:lnSpc>
+                <a:spcPct val="90000"/>
+              </a:lnSpc>
+              <a:spcBef>
+                <a:spcPts val="500"/>
+              </a:spcBef>
+              <a:buFont typeface="Arial" panose="020B0604020202020204" pitchFamily="34" charset="0"/>
+              <a:buNone/>
+              <a:defRPr sz="1800" kern="1200">
+                <a:solidFill>
+                  <a:schemeClr val="tx1"/>
+                </a:solidFill>
+                <a:latin typeface="+mn-lt"/>
+                <a:ea typeface="+mn-ea"/>
+                <a:cs typeface="+mn-cs"/>
+              </a:defRPr>
+            </a:lvl3pPr>
+            <a:lvl4pPr marL="1371600" indent="0" algn="ctr" defTabSz="914400" rtl="0" eaLnBrk="1" latinLnBrk="0" hangingPunct="1">
+              <a:lnSpc>
+                <a:spcPct val="90000"/>
+              </a:lnSpc>
+              <a:spcBef>
+                <a:spcPts val="500"/>
+              </a:spcBef>
+              <a:buFont typeface="Arial" panose="020B0604020202020204" pitchFamily="34" charset="0"/>
+              <a:buNone/>
+              <a:defRPr sz="1600" kern="1200">
+                <a:solidFill>
+                  <a:schemeClr val="tx1"/>
+                </a:solidFill>
+                <a:latin typeface="+mn-lt"/>
+                <a:ea typeface="+mn-ea"/>
+                <a:cs typeface="+mn-cs"/>
+              </a:defRPr>
+            </a:lvl4pPr>
+            <a:lvl5pPr marL="1828800" indent="0" algn="ctr" defTabSz="914400" rtl="0" eaLnBrk="1" latinLnBrk="0" hangingPunct="1">
+              <a:lnSpc>
+                <a:spcPct val="90000"/>
+              </a:lnSpc>
+              <a:spcBef>
+                <a:spcPts val="500"/>
+              </a:spcBef>
+              <a:buFont typeface="Arial" panose="020B0604020202020204" pitchFamily="34" charset="0"/>
+              <a:buNone/>
+              <a:defRPr sz="1600" kern="1200">
+                <a:solidFill>
+                  <a:schemeClr val="tx1"/>
+                </a:solidFill>
+                <a:latin typeface="+mn-lt"/>
+                <a:ea typeface="+mn-ea"/>
+                <a:cs typeface="+mn-cs"/>
+              </a:defRPr>
+            </a:lvl5pPr>
+            <a:lvl6pPr marL="2286000" indent="0" algn="ctr" defTabSz="914400" rtl="0" eaLnBrk="1" latinLnBrk="0" hangingPunct="1">
+              <a:lnSpc>
+                <a:spcPct val="90000"/>
+              </a:lnSpc>
+              <a:spcBef>
+                <a:spcPts val="500"/>
+              </a:spcBef>
+              <a:buFont typeface="Arial" panose="020B0604020202020204" pitchFamily="34" charset="0"/>
+              <a:buNone/>
+              <a:defRPr sz="1600" kern="1200">
+                <a:solidFill>
+                  <a:schemeClr val="tx1"/>
+                </a:solidFill>
+                <a:latin typeface="+mn-lt"/>
+                <a:ea typeface="+mn-ea"/>
+                <a:cs typeface="+mn-cs"/>
+              </a:defRPr>
+            </a:lvl6pPr>
+            <a:lvl7pPr marL="2743200" indent="0" algn="ctr" defTabSz="914400" rtl="0" eaLnBrk="1" latinLnBrk="0" hangingPunct="1">
+              <a:lnSpc>
+                <a:spcPct val="90000"/>
+              </a:lnSpc>
+              <a:spcBef>
+                <a:spcPts val="500"/>
+              </a:spcBef>
+              <a:buFont typeface="Arial" panose="020B0604020202020204" pitchFamily="34" charset="0"/>
+              <a:buNone/>
+              <a:defRPr sz="1600" kern="1200">
+                <a:solidFill>
+                  <a:schemeClr val="tx1"/>
+                </a:solidFill>
+                <a:latin typeface="+mn-lt"/>
+                <a:ea typeface="+mn-ea"/>
+                <a:cs typeface="+mn-cs"/>
+              </a:defRPr>
+            </a:lvl7pPr>
+            <a:lvl8pPr marL="3200400" indent="0" algn="ctr" defTabSz="914400" rtl="0" eaLnBrk="1" latinLnBrk="0" hangingPunct="1">
+              <a:lnSpc>
+                <a:spcPct val="90000"/>
+              </a:lnSpc>
+              <a:spcBef>
+                <a:spcPts val="500"/>
+              </a:spcBef>
+              <a:buFont typeface="Arial" panose="020B0604020202020204" pitchFamily="34" charset="0"/>
+              <a:buNone/>
+              <a:defRPr sz="1600" kern="1200">
+                <a:solidFill>
+                  <a:schemeClr val="tx1"/>
+                </a:solidFill>
+                <a:latin typeface="+mn-lt"/>
+                <a:ea typeface="+mn-ea"/>
+                <a:cs typeface="+mn-cs"/>
+              </a:defRPr>
+            </a:lvl8pPr>
+            <a:lvl9pPr marL="3657600" indent="0" algn="ctr" defTabSz="914400" rtl="0" eaLnBrk="1" latinLnBrk="0" hangingPunct="1">
+              <a:lnSpc>
+                <a:spcPct val="90000"/>
+              </a:lnSpc>
+              <a:spcBef>
+                <a:spcPts val="500"/>
+              </a:spcBef>
+              <a:buFont typeface="Arial" panose="020B0604020202020204" pitchFamily="34" charset="0"/>
+              <a:buNone/>
+              <a:defRPr sz="1600" kern="1200">
+                <a:solidFill>
+                  <a:schemeClr val="tx1"/>
+                </a:solidFill>
+                <a:latin typeface="+mn-lt"/>
+                <a:ea typeface="+mn-ea"/>
+                <a:cs typeface="+mn-cs"/>
+              </a:defRPr>
+            </a:lvl9pPr>
+          </a:lstStyle>
+          <a:p>
+            <a:pPr algn="l">
+              <a:buFont typeface="Arial" panose="020B0604020202020204" pitchFamily="34" charset="0"/>
+            </a:pPr>
+            <a:endParaRPr lang="en-IN" altLang="en-US" b="1">
+              <a:solidFill>
+                <a:schemeClr val="accent1"/>
+              </a:solidFill>
+              <a:effectLst>
+                <a:outerShdw blurRad="38100" dist="25400" dir="5400000" algn="ctr" rotWithShape="0">
+                  <a:srgbClr val="6E747A">
+                    <a:alpha val="43000"/>
+                  </a:srgbClr>
+                </a:outerShdw>
+              </a:effectLst>
+              <a:latin typeface="Times New Roman" panose="02020603050405020304" charset="0"/>
+              <a:cs typeface="Times New Roman" panose="02020603050405020304" charset="0"/>
+              <a:sym typeface="+mn-ea"/>
+            </a:endParaRPr>
+          </a:p>
+          <a:p>
+            <a:pPr algn="l">
+              <a:buFont typeface="Arial" panose="020B0604020202020204" pitchFamily="34" charset="0"/>
+            </a:pPr>
+            <a:r>
+              <a:rPr lang="en-IN" altLang="en-US" b="1">
+                <a:solidFill>
+                  <a:schemeClr val="accent1"/>
+                </a:solidFill>
+                <a:effectLst>
+                  <a:outerShdw blurRad="38100" dist="25400" dir="5400000" algn="ctr" rotWithShape="0">
+                    <a:srgbClr val="6E747A">
+                      <a:alpha val="43000"/>
+                    </a:srgbClr>
+                  </a:outerShdw>
+                </a:effectLst>
+                <a:latin typeface="Times New Roman" panose="02020603050405020304" charset="0"/>
+                <a:cs typeface="Times New Roman" panose="02020603050405020304" charset="0"/>
+                <a:sym typeface="+mn-ea"/>
+              </a:rPr>
+              <a:t>		     </a:t>
+            </a:r>
+            <a:r>
+              <a:rPr lang="en-IN" altLang="en-US" sz="4000" b="1">
+                <a:solidFill>
+                  <a:schemeClr val="accent1"/>
+                </a:solidFill>
+                <a:effectLst>
+                  <a:outerShdw blurRad="38100" dist="25400" dir="5400000" algn="ctr" rotWithShape="0">
+                    <a:srgbClr val="6E747A">
+                      <a:alpha val="43000"/>
+                    </a:srgbClr>
+                  </a:outerShdw>
+                </a:effectLst>
+                <a:latin typeface="Times New Roman" panose="02020603050405020304" charset="0"/>
+                <a:cs typeface="Times New Roman" panose="02020603050405020304" charset="0"/>
+                <a:sym typeface="+mn-ea"/>
+              </a:rPr>
+              <a:t>SVN</a:t>
+            </a:r>
+            <a:endParaRPr lang="en-IN" altLang="en-US" sz="4000" b="1">
+              <a:solidFill>
+                <a:schemeClr val="accent1"/>
+              </a:solidFill>
+              <a:effectLst>
+                <a:outerShdw blurRad="38100" dist="25400" dir="5400000" algn="ctr" rotWithShape="0">
+                  <a:srgbClr val="6E747A">
+                    <a:alpha val="43000"/>
+                  </a:srgbClr>
+                </a:outerShdw>
+              </a:effectLst>
+              <a:latin typeface="Times New Roman" panose="02020603050405020304" charset="0"/>
+              <a:cs typeface="Times New Roman" panose="02020603050405020304" charset="0"/>
+              <a:sym typeface="+mn-ea"/>
+            </a:endParaRPr>
+          </a:p>
+        </p:txBody>
+      </p:sp>
+    </p:spTree>
+  </p:cSld>
+  <p:clrMapOvr>
+    <a:masterClrMapping/>
+  </p:clrMapOvr>
+</p:sld>
+</file>
+
+<file path=ppt/slides/slide18.xml><?xml version="1.0" encoding="utf-8"?>
+<p:sld xmlns:a="http://schemas.openxmlformats.org/drawingml/2006/main" xmlns:r="http://schemas.openxmlformats.org/officeDocument/2006/relationships" xmlns:p="http://schemas.openxmlformats.org/presentationml/2006/main">
+  <p:cSld>
+    <p:spTree>
+      <p:nvGrpSpPr>
+        <p:cNvPr id="1" name=""/>
+        <p:cNvGrpSpPr/>
+        <p:nvPr/>
+      </p:nvGrpSpPr>
+      <p:grpSpPr/>
+      <p:sp>
+        <p:nvSpPr>
+          <p:cNvPr id="5" name="Title 4"/>
+          <p:cNvSpPr>
+            <a:spLocks noGrp="1"/>
+          </p:cNvSpPr>
+          <p:nvPr>
+            <p:ph type="title"/>
+          </p:nvPr>
+        </p:nvSpPr>
+        <p:spPr/>
+        <p:txBody>
+          <a:bodyPr/>
+          <a:p>
+            <a:endParaRPr lang="en-US"/>
+          </a:p>
+        </p:txBody>
+      </p:sp>
+      <p:pic>
+        <p:nvPicPr>
+          <p:cNvPr id="4" name="Content Placeholder 3" descr="TricolorFlag-LinksInd"/>
+          <p:cNvPicPr>
+            <a:picLocks noChangeAspect="1"/>
+          </p:cNvPicPr>
+          <p:nvPr>
+            <p:ph idx="1"/>
+          </p:nvPr>
+        </p:nvPicPr>
+        <p:blipFill>
+          <a:blip r:embed="rId1"/>
+          <a:stretch>
+            <a:fillRect/>
+          </a:stretch>
+        </p:blipFill>
+        <p:spPr>
+          <a:xfrm>
+            <a:off x="2950845" y="908685"/>
+            <a:ext cx="5579110" cy="4351655"/>
+          </a:xfrm>
+          <a:prstGeom prst="rect">
+            <a:avLst/>
+          </a:prstGeom>
+        </p:spPr>
+      </p:pic>
     </p:spTree>
   </p:cSld>
   <p:clrMapOvr>

</xml_diff>